<commit_message>
Updates the HansoftSVN Integration Overview presentation
</commit_message>
<xml_diff>
--- a/HansoftSVN Integration Overview.pptx
+++ b/HansoftSVN Integration Overview.pptx
@@ -10,8 +10,9 @@
     <p:sldId id="261" r:id="rId4"/>
     <p:sldId id="262" r:id="rId5"/>
     <p:sldId id="258" r:id="rId6"/>
-    <p:sldId id="259" r:id="rId7"/>
-    <p:sldId id="260" r:id="rId8"/>
+    <p:sldId id="263" r:id="rId7"/>
+    <p:sldId id="259" r:id="rId8"/>
+    <p:sldId id="260" r:id="rId9"/>
   </p:sldIdLst>
   <p:sldSz cx="9144000" cy="6858000" type="screen4x3"/>
   <p:notesSz cx="6858000" cy="9144000"/>
@@ -295,7 +296,7 @@
             <a:fld id="{A85315BB-618E-E34C-99D4-26B490314AB3}" type="datetimeFigureOut">
               <a:rPr lang="sv-SE" smtClean="0"/>
               <a:pPr/>
-              <a:t>14-08-25</a:t>
+              <a:t>14-09-04</a:t>
             </a:fld>
             <a:endParaRPr lang="en-US"/>
           </a:p>
@@ -462,7 +463,7 @@
             <a:fld id="{A85315BB-618E-E34C-99D4-26B490314AB3}" type="datetimeFigureOut">
               <a:rPr lang="sv-SE" smtClean="0"/>
               <a:pPr/>
-              <a:t>14-08-25</a:t>
+              <a:t>14-09-04</a:t>
             </a:fld>
             <a:endParaRPr lang="en-US"/>
           </a:p>
@@ -639,7 +640,7 @@
             <a:fld id="{A85315BB-618E-E34C-99D4-26B490314AB3}" type="datetimeFigureOut">
               <a:rPr lang="sv-SE" smtClean="0"/>
               <a:pPr/>
-              <a:t>14-08-25</a:t>
+              <a:t>14-09-04</a:t>
             </a:fld>
             <a:endParaRPr lang="en-US"/>
           </a:p>
@@ -806,7 +807,7 @@
             <a:fld id="{A85315BB-618E-E34C-99D4-26B490314AB3}" type="datetimeFigureOut">
               <a:rPr lang="sv-SE" smtClean="0"/>
               <a:pPr/>
-              <a:t>14-08-25</a:t>
+              <a:t>14-09-04</a:t>
             </a:fld>
             <a:endParaRPr lang="en-US"/>
           </a:p>
@@ -1049,7 +1050,7 @@
             <a:fld id="{A85315BB-618E-E34C-99D4-26B490314AB3}" type="datetimeFigureOut">
               <a:rPr lang="sv-SE" smtClean="0"/>
               <a:pPr/>
-              <a:t>14-08-25</a:t>
+              <a:t>14-09-04</a:t>
             </a:fld>
             <a:endParaRPr lang="en-US"/>
           </a:p>
@@ -1334,7 +1335,7 @@
             <a:fld id="{A85315BB-618E-E34C-99D4-26B490314AB3}" type="datetimeFigureOut">
               <a:rPr lang="sv-SE" smtClean="0"/>
               <a:pPr/>
-              <a:t>14-08-25</a:t>
+              <a:t>14-09-04</a:t>
             </a:fld>
             <a:endParaRPr lang="en-US"/>
           </a:p>
@@ -1753,7 +1754,7 @@
             <a:fld id="{A85315BB-618E-E34C-99D4-26B490314AB3}" type="datetimeFigureOut">
               <a:rPr lang="sv-SE" smtClean="0"/>
               <a:pPr/>
-              <a:t>14-08-25</a:t>
+              <a:t>14-09-04</a:t>
             </a:fld>
             <a:endParaRPr lang="en-US"/>
           </a:p>
@@ -1868,7 +1869,7 @@
             <a:fld id="{A85315BB-618E-E34C-99D4-26B490314AB3}" type="datetimeFigureOut">
               <a:rPr lang="sv-SE" smtClean="0"/>
               <a:pPr/>
-              <a:t>14-08-25</a:t>
+              <a:t>14-09-04</a:t>
             </a:fld>
             <a:endParaRPr lang="en-US"/>
           </a:p>
@@ -1960,7 +1961,7 @@
             <a:fld id="{A85315BB-618E-E34C-99D4-26B490314AB3}" type="datetimeFigureOut">
               <a:rPr lang="sv-SE" smtClean="0"/>
               <a:pPr/>
-              <a:t>14-08-25</a:t>
+              <a:t>14-09-04</a:t>
             </a:fld>
             <a:endParaRPr lang="en-US"/>
           </a:p>
@@ -2234,7 +2235,7 @@
             <a:fld id="{A85315BB-618E-E34C-99D4-26B490314AB3}" type="datetimeFigureOut">
               <a:rPr lang="sv-SE" smtClean="0"/>
               <a:pPr/>
-              <a:t>14-08-25</a:t>
+              <a:t>14-09-04</a:t>
             </a:fld>
             <a:endParaRPr lang="en-US"/>
           </a:p>
@@ -2484,7 +2485,7 @@
             <a:fld id="{A85315BB-618E-E34C-99D4-26B490314AB3}" type="datetimeFigureOut">
               <a:rPr lang="sv-SE" smtClean="0"/>
               <a:pPr/>
-              <a:t>14-08-25</a:t>
+              <a:t>14-09-04</a:t>
             </a:fld>
             <a:endParaRPr lang="en-US"/>
           </a:p>
@@ -2694,7 +2695,7 @@
             <a:fld id="{A85315BB-618E-E34C-99D4-26B490314AB3}" type="datetimeFigureOut">
               <a:rPr lang="sv-SE" smtClean="0"/>
               <a:pPr/>
-              <a:t>14-08-25</a:t>
+              <a:t>14-09-04</a:t>
             </a:fld>
             <a:endParaRPr lang="en-US"/>
           </a:p>
@@ -3108,8 +3109,14 @@
           <a:lstStyle/>
           <a:p>
             <a:r>
+              <a:rPr lang="en-US" i="1" dirty="0" smtClean="0"/>
+              <a:t>Draft</a:t>
+            </a:r>
+          </a:p>
+          <a:p>
+            <a:r>
               <a:rPr lang="en-US" dirty="0" smtClean="0"/>
-              <a:t>2014-08-19</a:t>
+              <a:t>2014-09-03</a:t>
             </a:r>
             <a:endParaRPr lang="en-US" dirty="0"/>
           </a:p>
@@ -3120,6 +3127,13 @@
   <p:clrMapOvr>
     <a:masterClrMapping/>
   </p:clrMapOvr>
+  <p:timing>
+    <p:tnLst>
+      <p:par>
+        <p:cTn id="1" dur="indefinite" restart="never" nodeType="tmRoot"/>
+      </p:par>
+    </p:tnLst>
+  </p:timing>
 </p:sld>
 </file>
 
@@ -3269,16 +3283,21 @@
             <p:ph type="title"/>
           </p:nvPr>
         </p:nvSpPr>
-        <p:spPr/>
+        <p:spPr>
+          <a:xfrm>
+            <a:off x="457200" y="6798"/>
+            <a:ext cx="8229600" cy="1143000"/>
+          </a:xfrm>
+        </p:spPr>
         <p:txBody>
           <a:bodyPr/>
           <a:lstStyle/>
           <a:p>
             <a:r>
-              <a:rPr lang="en-US" smtClean="0"/>
+              <a:rPr lang="en-US" dirty="0" smtClean="0"/>
               <a:t>Overview</a:t>
             </a:r>
-            <a:endParaRPr lang="en-US"/>
+            <a:endParaRPr lang="en-US" dirty="0"/>
           </a:p>
         </p:txBody>
       </p:sp>
@@ -3375,9 +3394,14 @@
           <a:lstStyle/>
           <a:p>
             <a:r>
-              <a:rPr lang="en-US"/>
-              <a:t>Python http server</a:t>
-            </a:r>
+              <a:rPr lang="en-US" dirty="0" smtClean="0"/>
+              <a:t>a</a:t>
+            </a:r>
+            <a:r>
+              <a:rPr lang="en-US" dirty="0" smtClean="0"/>
+              <a:t>nnotation server</a:t>
+            </a:r>
+            <a:endParaRPr lang="en-US" dirty="0"/>
           </a:p>
         </p:txBody>
       </p:sp>
@@ -3847,14 +3871,19 @@
             <p:ph type="title"/>
           </p:nvPr>
         </p:nvSpPr>
-        <p:spPr/>
+        <p:spPr>
+          <a:xfrm>
+            <a:off x="457200" y="-1842"/>
+            <a:ext cx="8229600" cy="1143000"/>
+          </a:xfrm>
+        </p:spPr>
         <p:txBody>
           <a:bodyPr/>
           <a:lstStyle/>
           <a:p>
             <a:r>
               <a:rPr lang="en-US" dirty="0" smtClean="0"/>
-              <a:t>Flow</a:t>
+              <a:t>Sequence at commit</a:t>
             </a:r>
             <a:endParaRPr lang="en-US" dirty="0"/>
           </a:p>
@@ -4089,8 +4118,12 @@
           <a:lstStyle/>
           <a:p>
             <a:r>
+              <a:rPr lang="en-US" dirty="0" smtClean="0"/>
+              <a:t>annotation  </a:t>
+            </a:r>
+            <a:r>
               <a:rPr lang="en-US" dirty="0"/>
-              <a:t>Python http server</a:t>
+              <a:t>server</a:t>
             </a:r>
           </a:p>
         </p:txBody>
@@ -4816,7 +4849,7 @@
             </a:xfrm>
             <a:prstGeom prst="curvedConnector4">
               <a:avLst>
-                <a:gd name="adj1" fmla="val -57023"/>
+                <a:gd name="adj1" fmla="val -14027"/>
                 <a:gd name="adj2" fmla="val 146173"/>
               </a:avLst>
             </a:prstGeom>
@@ -5034,7 +5067,9 @@
         </p:nvSpPr>
         <p:spPr/>
         <p:txBody>
-          <a:bodyPr/>
+          <a:bodyPr>
+            <a:normAutofit lnSpcReduction="10000"/>
+          </a:bodyPr>
           <a:lstStyle/>
           <a:p>
             <a:r>
@@ -5093,11 +5128,16 @@
               <a:rPr lang="en-US" dirty="0" smtClean="0"/>
               <a:t>” – details, see TBD</a:t>
             </a:r>
+            <a:endParaRPr lang="en-US" dirty="0" smtClean="0"/>
           </a:p>
           <a:p>
             <a:r>
               <a:rPr lang="en-US" dirty="0" smtClean="0"/>
-              <a:t>On a suitable server, deploy the ”</a:t>
+              <a:t>Deploy </a:t>
+            </a:r>
+            <a:r>
+              <a:rPr lang="en-US" dirty="0" smtClean="0"/>
+              <a:t>the ”</a:t>
             </a:r>
             <a:r>
               <a:rPr lang="en-US" dirty="0" err="1" smtClean="0"/>
@@ -5105,9 +5145,42 @@
             </a:r>
             <a:r>
               <a:rPr lang="en-US" dirty="0" smtClean="0"/>
-              <a:t>-integration” package – details TBD</a:t>
-            </a:r>
-            <a:endParaRPr lang="en-US" dirty="0"/>
+              <a:t>-integration” package</a:t>
+            </a:r>
+            <a:r>
+              <a:rPr lang="en-US" dirty="0" smtClean="0"/>
+              <a:t> </a:t>
+            </a:r>
+          </a:p>
+          <a:p>
+            <a:pPr lvl="1"/>
+            <a:r>
+              <a:rPr lang="en-US" dirty="0" smtClean="0"/>
+              <a:t>Configure the </a:t>
+            </a:r>
+            <a:r>
+              <a:rPr lang="en-US" dirty="0" err="1" smtClean="0"/>
+              <a:t>server.properties</a:t>
+            </a:r>
+            <a:r>
+              <a:rPr lang="en-US" dirty="0" smtClean="0"/>
+              <a:t> file</a:t>
+            </a:r>
+          </a:p>
+          <a:p>
+            <a:pPr lvl="1"/>
+            <a:r>
+              <a:rPr lang="en-US" dirty="0" smtClean="0"/>
+              <a:t>Launch using </a:t>
+            </a:r>
+            <a:r>
+              <a:rPr lang="en-US" dirty="0" err="1" smtClean="0"/>
+              <a:t>integrationserver.sh</a:t>
+            </a:r>
+            <a:r>
+              <a:rPr lang="en-US" dirty="0" smtClean="0"/>
+              <a:t>/.bat</a:t>
+            </a:r>
           </a:p>
         </p:txBody>
       </p:sp>
@@ -5116,6 +5189,13 @@
   <p:clrMapOvr>
     <a:masterClrMapping/>
   </p:clrMapOvr>
+  <p:timing>
+    <p:tnLst>
+      <p:par>
+        <p:cTn id="1" dur="indefinite" restart="never" nodeType="tmRoot"/>
+      </p:par>
+    </p:tnLst>
+  </p:timing>
 </p:sld>
 </file>
 
@@ -5175,50 +5255,74 @@
           <a:lstStyle/>
           <a:p>
             <a:r>
-              <a:rPr lang="en-US" smtClean="0"/>
+              <a:rPr lang="en-US" dirty="0" smtClean="0"/>
               <a:t>Integration Server settings</a:t>
             </a:r>
           </a:p>
           <a:p>
             <a:pPr lvl="1"/>
             <a:r>
-              <a:rPr lang="en-US" smtClean="0"/>
-              <a:t>SVN/Hansoft user mapping</a:t>
+              <a:rPr lang="en-US" dirty="0" smtClean="0"/>
+              <a:t>SVN/</a:t>
+            </a:r>
+            <a:r>
+              <a:rPr lang="en-US" dirty="0" err="1" smtClean="0"/>
+              <a:t>Hansoft</a:t>
+            </a:r>
+            <a:r>
+              <a:rPr lang="en-US" dirty="0" smtClean="0"/>
+              <a:t> user mapping</a:t>
             </a:r>
           </a:p>
           <a:p>
             <a:pPr lvl="1"/>
             <a:r>
-              <a:rPr lang="en-US" smtClean="0"/>
-              <a:t>Hansoft SDK user/pass</a:t>
+              <a:rPr lang="en-US" dirty="0" err="1" smtClean="0"/>
+              <a:t>Hansoft</a:t>
+            </a:r>
+            <a:r>
+              <a:rPr lang="en-US" dirty="0" smtClean="0"/>
+              <a:t> SDK username/password</a:t>
             </a:r>
           </a:p>
           <a:p>
             <a:pPr lvl="1"/>
             <a:r>
-              <a:rPr lang="en-US" smtClean="0"/>
-              <a:t>Hansoft Database</a:t>
+              <a:rPr lang="en-US" dirty="0" err="1" smtClean="0"/>
+              <a:t>Hansoft</a:t>
+            </a:r>
+            <a:r>
+              <a:rPr lang="en-US" dirty="0" smtClean="0"/>
+              <a:t> Database</a:t>
             </a:r>
           </a:p>
           <a:p>
             <a:pPr lvl="1"/>
             <a:r>
-              <a:rPr lang="en-US" smtClean="0"/>
-              <a:t>Hansoft SDK or library path</a:t>
+              <a:rPr lang="en-US" dirty="0" err="1" smtClean="0"/>
+              <a:t>Hansoft</a:t>
+            </a:r>
+            <a:r>
+              <a:rPr lang="en-US" dirty="0" smtClean="0"/>
+              <a:t> SDK or library path</a:t>
             </a:r>
           </a:p>
           <a:p>
             <a:pPr lvl="1"/>
             <a:r>
-              <a:rPr lang="en-US" smtClean="0"/>
-              <a:t>Hansoft server host, port</a:t>
-            </a:r>
-          </a:p>
-          <a:p>
-            <a:endParaRPr lang="en-US" smtClean="0"/>
-          </a:p>
-          <a:p>
-            <a:endParaRPr lang="en-US"/>
+              <a:rPr lang="en-US" dirty="0" err="1" smtClean="0"/>
+              <a:t>Hansoft</a:t>
+            </a:r>
+            <a:r>
+              <a:rPr lang="en-US" dirty="0" smtClean="0"/>
+              <a:t> server host, port</a:t>
+            </a:r>
+          </a:p>
+          <a:p>
+            <a:endParaRPr lang="en-US" dirty="0" smtClean="0"/>
+          </a:p>
+          <a:p>
+            <a:endParaRPr lang="en-US" dirty="0"/>
           </a:p>
         </p:txBody>
       </p:sp>
@@ -5266,42 +5370,107 @@
         </p:nvSpPr>
         <p:spPr/>
         <p:txBody>
-          <a:bodyPr>
-            <a:normAutofit fontScale="90000"/>
-          </a:bodyPr>
+          <a:bodyPr/>
           <a:lstStyle/>
           <a:p>
             <a:r>
               <a:rPr lang="en-US" dirty="0" smtClean="0"/>
-              <a:t>Launching</a:t>
-            </a:r>
-            <a:br>
+              <a:t>Ports</a:t>
+            </a:r>
+            <a:endParaRPr lang="en-US" dirty="0"/>
+          </a:p>
+        </p:txBody>
+      </p:sp>
+      <p:sp>
+        <p:nvSpPr>
+          <p:cNvPr id="3" name="Platshållare för innehåll 2"/>
+          <p:cNvSpPr>
+            <a:spLocks noGrp="1"/>
+          </p:cNvSpPr>
+          <p:nvPr>
+            <p:ph idx="1"/>
+          </p:nvPr>
+        </p:nvSpPr>
+        <p:spPr/>
+        <p:txBody>
+          <a:bodyPr/>
+          <a:lstStyle/>
+          <a:p>
+            <a:r>
               <a:rPr lang="en-US" dirty="0" smtClean="0"/>
-            </a:br>
-            <a:endParaRPr lang="en-US" dirty="0"/>
-          </a:p>
-        </p:txBody>
-      </p:sp>
-      <p:sp>
-        <p:nvSpPr>
-          <p:cNvPr id="3" name="Platshållare för innehåll 2"/>
-          <p:cNvSpPr>
-            <a:spLocks noGrp="1"/>
-          </p:cNvSpPr>
-          <p:nvPr>
-            <p:ph idx="1"/>
-          </p:nvPr>
-        </p:nvSpPr>
-        <p:spPr/>
-        <p:txBody>
-          <a:bodyPr/>
-          <a:lstStyle/>
-          <a:p>
+              <a:t>Integration Server listens to port 9005</a:t>
+            </a:r>
+          </a:p>
+          <a:p>
+            <a:pPr lvl="1"/>
             <a:r>
               <a:rPr lang="en-US" dirty="0" smtClean="0"/>
-              <a:t>TODO: Describe how to launch the integration</a:t>
-            </a:r>
-            <a:endParaRPr lang="en-US" dirty="0"/>
+              <a:t>Configurable in the </a:t>
+            </a:r>
+            <a:r>
+              <a:rPr lang="en-US" dirty="0" err="1" smtClean="0"/>
+              <a:t>server.properties</a:t>
+            </a:r>
+            <a:r>
+              <a:rPr lang="en-US" dirty="0" smtClean="0"/>
+              <a:t> file</a:t>
+            </a:r>
+          </a:p>
+          <a:p>
+            <a:r>
+              <a:rPr lang="en-US" dirty="0" smtClean="0"/>
+              <a:t>The SVN annotation server listens to port 9006</a:t>
+            </a:r>
+          </a:p>
+          <a:p>
+            <a:pPr lvl="1"/>
+            <a:r>
+              <a:rPr lang="en-US" dirty="0" smtClean="0"/>
+              <a:t>Configurable in</a:t>
+            </a:r>
+            <a:r>
+              <a:rPr lang="en-US" dirty="0" smtClean="0"/>
+              <a:t> </a:t>
+            </a:r>
+          </a:p>
+          <a:p>
+            <a:pPr lvl="2"/>
+            <a:r>
+              <a:rPr lang="en-US" dirty="0" smtClean="0"/>
+              <a:t>hook</a:t>
+            </a:r>
+            <a:r>
+              <a:rPr lang="en-US" dirty="0" smtClean="0"/>
+              <a:t>-</a:t>
+            </a:r>
+            <a:r>
+              <a:rPr lang="en-US" dirty="0" err="1" smtClean="0"/>
+              <a:t>config.conf</a:t>
+            </a:r>
+            <a:r>
+              <a:rPr lang="en-US" dirty="0" smtClean="0"/>
+              <a:t> </a:t>
+            </a:r>
+            <a:r>
+              <a:rPr lang="en-US" dirty="0" smtClean="0"/>
+              <a:t>file </a:t>
+            </a:r>
+            <a:r>
+              <a:rPr lang="en-US" dirty="0" smtClean="0"/>
+              <a:t>– for the SVN post-commit hook</a:t>
+            </a:r>
+          </a:p>
+          <a:p>
+            <a:pPr lvl="2"/>
+            <a:r>
+              <a:rPr lang="en-US" dirty="0" err="1" smtClean="0"/>
+              <a:t>server.properties</a:t>
+            </a:r>
+            <a:r>
+              <a:rPr lang="en-US" dirty="0" smtClean="0"/>
+              <a:t> – for the Integration Server</a:t>
+            </a:r>
+            <a:endParaRPr lang="en-US" dirty="0" smtClean="0"/>
           </a:p>
         </p:txBody>
       </p:sp>
@@ -5342,6 +5511,168 @@
         </p:nvSpPr>
         <p:spPr/>
         <p:txBody>
+          <a:bodyPr>
+            <a:normAutofit fontScale="90000"/>
+          </a:bodyPr>
+          <a:lstStyle/>
+          <a:p>
+            <a:r>
+              <a:rPr lang="en-US" dirty="0" smtClean="0"/>
+              <a:t>Launching</a:t>
+            </a:r>
+            <a:br>
+              <a:rPr lang="en-US" dirty="0" smtClean="0"/>
+            </a:br>
+            <a:endParaRPr lang="en-US" dirty="0"/>
+          </a:p>
+        </p:txBody>
+      </p:sp>
+      <p:sp>
+        <p:nvSpPr>
+          <p:cNvPr id="3" name="Platshållare för innehåll 2"/>
+          <p:cNvSpPr>
+            <a:spLocks noGrp="1"/>
+          </p:cNvSpPr>
+          <p:nvPr>
+            <p:ph idx="1"/>
+          </p:nvPr>
+        </p:nvSpPr>
+        <p:spPr/>
+        <p:txBody>
+          <a:bodyPr/>
+          <a:lstStyle/>
+          <a:p>
+            <a:pPr marL="514350" indent="-514350">
+              <a:buFont typeface="+mj-lt"/>
+              <a:buAutoNum type="arabicPeriod"/>
+            </a:pPr>
+            <a:r>
+              <a:rPr lang="en-US" dirty="0" smtClean="0"/>
+              <a:t>Start the integration server with the launch script:</a:t>
+            </a:r>
+          </a:p>
+          <a:p>
+            <a:pPr lvl="1"/>
+            <a:r>
+              <a:rPr lang="en-US" dirty="0" smtClean="0"/>
+              <a:t>Linux/OSX:  </a:t>
+            </a:r>
+            <a:r>
+              <a:rPr lang="en-US" dirty="0" err="1" smtClean="0">
+                <a:latin typeface="Courier New"/>
+                <a:cs typeface="Courier New"/>
+              </a:rPr>
+              <a:t>integrationserver.sh</a:t>
+            </a:r>
+            <a:endParaRPr lang="en-US" dirty="0" smtClean="0">
+              <a:latin typeface="Courier New"/>
+              <a:cs typeface="Courier New"/>
+            </a:endParaRPr>
+          </a:p>
+          <a:p>
+            <a:pPr lvl="1"/>
+            <a:r>
+              <a:rPr lang="en-US" dirty="0" smtClean="0"/>
+              <a:t>Windows:  </a:t>
+            </a:r>
+            <a:r>
+              <a:rPr lang="en-US" dirty="0" err="1" smtClean="0">
+                <a:latin typeface="Courier New"/>
+                <a:cs typeface="Courier New"/>
+              </a:rPr>
+              <a:t>integrationserver.bat</a:t>
+            </a:r>
+            <a:endParaRPr lang="en-US" dirty="0" smtClean="0">
+              <a:latin typeface="Courier New"/>
+              <a:cs typeface="Courier New"/>
+            </a:endParaRPr>
+          </a:p>
+          <a:p>
+            <a:pPr marL="514350" indent="-514350">
+              <a:buFont typeface="+mj-lt"/>
+              <a:buAutoNum type="arabicPeriod"/>
+            </a:pPr>
+            <a:r>
+              <a:rPr lang="en-US" dirty="0" smtClean="0"/>
+              <a:t>Start the SVN annotation server:</a:t>
+            </a:r>
+          </a:p>
+          <a:p>
+            <a:pPr lvl="1"/>
+            <a:r>
+              <a:rPr lang="en-US" dirty="0" smtClean="0"/>
+              <a:t>Linux/OSX:  </a:t>
+            </a:r>
+            <a:r>
+              <a:rPr lang="en-US" dirty="0" err="1" smtClean="0">
+                <a:latin typeface="Courier New"/>
+                <a:cs typeface="Courier New"/>
+              </a:rPr>
+              <a:t>run_hansoftserver.sh</a:t>
+            </a:r>
+            <a:endParaRPr lang="en-US" dirty="0" smtClean="0">
+              <a:latin typeface="Courier New"/>
+              <a:cs typeface="Courier New"/>
+            </a:endParaRPr>
+          </a:p>
+          <a:p>
+            <a:pPr lvl="1"/>
+            <a:r>
+              <a:rPr lang="en-US" dirty="0" smtClean="0"/>
+              <a:t>Windows:  </a:t>
+            </a:r>
+            <a:r>
+              <a:rPr lang="en-US" dirty="0" err="1" smtClean="0">
+                <a:latin typeface="Courier New"/>
+                <a:cs typeface="Courier New"/>
+              </a:rPr>
+              <a:t>run_hansoftserver.bat</a:t>
+            </a:r>
+            <a:endParaRPr lang="en-US" dirty="0" smtClean="0"/>
+          </a:p>
+          <a:p>
+            <a:pPr lvl="1"/>
+            <a:endParaRPr lang="en-US" dirty="0"/>
+          </a:p>
+        </p:txBody>
+      </p:sp>
+    </p:spTree>
+  </p:cSld>
+  <p:clrMapOvr>
+    <a:masterClrMapping/>
+  </p:clrMapOvr>
+</p:sld>
+</file>
+
+<file path=ppt/slides/slide8.xml><?xml version="1.0" encoding="utf-8"?>
+<p:sld xmlns:a="http://schemas.openxmlformats.org/drawingml/2006/main" xmlns:r="http://schemas.openxmlformats.org/officeDocument/2006/relationships" xmlns:mc="http://schemas.openxmlformats.org/markup-compatibility/2006" xmlns:mv="urn:schemas-microsoft-com:mac:vml" xmlns:p="http://schemas.openxmlformats.org/presentationml/2006/main" mc:Ignorable="mv" mc:PreserveAttributes="mv:*">
+  <p:cSld>
+    <p:spTree>
+      <p:nvGrpSpPr>
+        <p:cNvPr id="1" name=""/>
+        <p:cNvGrpSpPr/>
+        <p:nvPr/>
+      </p:nvGrpSpPr>
+      <p:grpSpPr>
+        <a:xfrm>
+          <a:off x="0" y="0"/>
+          <a:ext cx="0" cy="0"/>
+          <a:chOff x="0" y="0"/>
+          <a:chExt cx="0" cy="0"/>
+        </a:xfrm>
+      </p:grpSpPr>
+      <p:sp>
+        <p:nvSpPr>
+          <p:cNvPr id="2" name="Rubrik 1"/>
+          <p:cNvSpPr>
+            <a:spLocks noGrp="1"/>
+          </p:cNvSpPr>
+          <p:nvPr>
+            <p:ph type="title"/>
+          </p:nvPr>
+        </p:nvSpPr>
+        <p:spPr/>
+        <p:txBody>
           <a:bodyPr/>
           <a:lstStyle/>
           <a:p>
@@ -5368,9 +5699,36 @@
           <a:bodyPr/>
           <a:lstStyle/>
           <a:p>
+            <a:pPr>
+              <a:buNone/>
+            </a:pPr>
             <a:r>
               <a:rPr lang="en-US" dirty="0" smtClean="0"/>
-              <a:t>TODO: List current limitations</a:t>
+              <a:t>Limitations as of 2014-09-03:</a:t>
+            </a:r>
+          </a:p>
+          <a:p>
+            <a:r>
+              <a:rPr lang="en-US" dirty="0" smtClean="0"/>
+              <a:t>Connecting </a:t>
+            </a:r>
+            <a:r>
+              <a:rPr lang="en-US" dirty="0" err="1" smtClean="0"/>
+              <a:t>Hansoft</a:t>
+            </a:r>
+            <a:r>
+              <a:rPr lang="en-US" dirty="0" smtClean="0"/>
+              <a:t> items to previous commits not yet implemented</a:t>
+            </a:r>
+          </a:p>
+          <a:p>
+            <a:r>
+              <a:rPr lang="en-US" smtClean="0"/>
+              <a:t>Client plug-in </a:t>
+            </a:r>
+            <a:r>
+              <a:rPr lang="en-US" dirty="0" smtClean="0"/>
+              <a:t>not yet available for Windows</a:t>
             </a:r>
             <a:endParaRPr lang="en-US" dirty="0"/>
           </a:p>

</xml_diff>

<commit_message>
Makes UC4 (post annotate Hansoft Item) work on OSX.
</commit_message>
<xml_diff>
--- a/HansoftSVN Integration Overview.pptx
+++ b/HansoftSVN Integration Overview.pptx
@@ -8,11 +8,12 @@
     <p:sldId id="256" r:id="rId2"/>
     <p:sldId id="257" r:id="rId3"/>
     <p:sldId id="261" r:id="rId4"/>
-    <p:sldId id="262" r:id="rId5"/>
-    <p:sldId id="258" r:id="rId6"/>
-    <p:sldId id="263" r:id="rId7"/>
-    <p:sldId id="259" r:id="rId8"/>
-    <p:sldId id="260" r:id="rId9"/>
+    <p:sldId id="264" r:id="rId5"/>
+    <p:sldId id="262" r:id="rId6"/>
+    <p:sldId id="258" r:id="rId7"/>
+    <p:sldId id="263" r:id="rId8"/>
+    <p:sldId id="259" r:id="rId9"/>
+    <p:sldId id="260" r:id="rId10"/>
   </p:sldIdLst>
   <p:sldSz cx="9144000" cy="6858000" type="screen4x3"/>
   <p:notesSz cx="6858000" cy="9144000"/>
@@ -296,7 +297,7 @@
             <a:fld id="{A85315BB-618E-E34C-99D4-26B490314AB3}" type="datetimeFigureOut">
               <a:rPr lang="sv-SE" smtClean="0"/>
               <a:pPr/>
-              <a:t>14-09-04</a:t>
+              <a:t>14-10-27</a:t>
             </a:fld>
             <a:endParaRPr lang="en-US"/>
           </a:p>
@@ -463,7 +464,7 @@
             <a:fld id="{A85315BB-618E-E34C-99D4-26B490314AB3}" type="datetimeFigureOut">
               <a:rPr lang="sv-SE" smtClean="0"/>
               <a:pPr/>
-              <a:t>14-09-04</a:t>
+              <a:t>14-10-27</a:t>
             </a:fld>
             <a:endParaRPr lang="en-US"/>
           </a:p>
@@ -640,7 +641,7 @@
             <a:fld id="{A85315BB-618E-E34C-99D4-26B490314AB3}" type="datetimeFigureOut">
               <a:rPr lang="sv-SE" smtClean="0"/>
               <a:pPr/>
-              <a:t>14-09-04</a:t>
+              <a:t>14-10-27</a:t>
             </a:fld>
             <a:endParaRPr lang="en-US"/>
           </a:p>
@@ -807,7 +808,7 @@
             <a:fld id="{A85315BB-618E-E34C-99D4-26B490314AB3}" type="datetimeFigureOut">
               <a:rPr lang="sv-SE" smtClean="0"/>
               <a:pPr/>
-              <a:t>14-09-04</a:t>
+              <a:t>14-10-27</a:t>
             </a:fld>
             <a:endParaRPr lang="en-US"/>
           </a:p>
@@ -1050,7 +1051,7 @@
             <a:fld id="{A85315BB-618E-E34C-99D4-26B490314AB3}" type="datetimeFigureOut">
               <a:rPr lang="sv-SE" smtClean="0"/>
               <a:pPr/>
-              <a:t>14-09-04</a:t>
+              <a:t>14-10-27</a:t>
             </a:fld>
             <a:endParaRPr lang="en-US"/>
           </a:p>
@@ -1335,7 +1336,7 @@
             <a:fld id="{A85315BB-618E-E34C-99D4-26B490314AB3}" type="datetimeFigureOut">
               <a:rPr lang="sv-SE" smtClean="0"/>
               <a:pPr/>
-              <a:t>14-09-04</a:t>
+              <a:t>14-10-27</a:t>
             </a:fld>
             <a:endParaRPr lang="en-US"/>
           </a:p>
@@ -1754,7 +1755,7 @@
             <a:fld id="{A85315BB-618E-E34C-99D4-26B490314AB3}" type="datetimeFigureOut">
               <a:rPr lang="sv-SE" smtClean="0"/>
               <a:pPr/>
-              <a:t>14-09-04</a:t>
+              <a:t>14-10-27</a:t>
             </a:fld>
             <a:endParaRPr lang="en-US"/>
           </a:p>
@@ -1869,7 +1870,7 @@
             <a:fld id="{A85315BB-618E-E34C-99D4-26B490314AB3}" type="datetimeFigureOut">
               <a:rPr lang="sv-SE" smtClean="0"/>
               <a:pPr/>
-              <a:t>14-09-04</a:t>
+              <a:t>14-10-27</a:t>
             </a:fld>
             <a:endParaRPr lang="en-US"/>
           </a:p>
@@ -1961,7 +1962,7 @@
             <a:fld id="{A85315BB-618E-E34C-99D4-26B490314AB3}" type="datetimeFigureOut">
               <a:rPr lang="sv-SE" smtClean="0"/>
               <a:pPr/>
-              <a:t>14-09-04</a:t>
+              <a:t>14-10-27</a:t>
             </a:fld>
             <a:endParaRPr lang="en-US"/>
           </a:p>
@@ -2235,7 +2236,7 @@
             <a:fld id="{A85315BB-618E-E34C-99D4-26B490314AB3}" type="datetimeFigureOut">
               <a:rPr lang="sv-SE" smtClean="0"/>
               <a:pPr/>
-              <a:t>14-09-04</a:t>
+              <a:t>14-10-27</a:t>
             </a:fld>
             <a:endParaRPr lang="en-US"/>
           </a:p>
@@ -2485,7 +2486,7 @@
             <a:fld id="{A85315BB-618E-E34C-99D4-26B490314AB3}" type="datetimeFigureOut">
               <a:rPr lang="sv-SE" smtClean="0"/>
               <a:pPr/>
-              <a:t>14-09-04</a:t>
+              <a:t>14-10-27</a:t>
             </a:fld>
             <a:endParaRPr lang="en-US"/>
           </a:p>
@@ -2695,7 +2696,7 @@
             <a:fld id="{A85315BB-618E-E34C-99D4-26B490314AB3}" type="datetimeFigureOut">
               <a:rPr lang="sv-SE" smtClean="0"/>
               <a:pPr/>
-              <a:t>14-09-04</a:t>
+              <a:t>14-10-27</a:t>
             </a:fld>
             <a:endParaRPr lang="en-US"/>
           </a:p>
@@ -3395,11 +3396,7 @@
           <a:p>
             <a:r>
               <a:rPr lang="en-US" dirty="0" smtClean="0"/>
-              <a:t>a</a:t>
-            </a:r>
-            <a:r>
-              <a:rPr lang="en-US" dirty="0" smtClean="0"/>
-              <a:t>nnotation server</a:t>
+              <a:t>annotation server</a:t>
             </a:r>
             <a:endParaRPr lang="en-US" dirty="0"/>
           </a:p>
@@ -5034,6 +5031,265 @@
       </p:grpSpPr>
       <p:sp>
         <p:nvSpPr>
+          <p:cNvPr id="103" name="Cylinder 102"/>
+          <p:cNvSpPr/>
+          <p:nvPr/>
+        </p:nvSpPr>
+        <p:spPr>
+          <a:xfrm>
+            <a:off x="3071996" y="4335517"/>
+            <a:ext cx="2793120" cy="2522483"/>
+          </a:xfrm>
+          <a:prstGeom prst="can">
+            <a:avLst/>
+          </a:prstGeom>
+        </p:spPr>
+        <p:style>
+          <a:lnRef idx="1">
+            <a:schemeClr val="accent1"/>
+          </a:lnRef>
+          <a:fillRef idx="3">
+            <a:schemeClr val="accent1"/>
+          </a:fillRef>
+          <a:effectRef idx="2">
+            <a:schemeClr val="accent1"/>
+          </a:effectRef>
+          <a:fontRef idx="minor">
+            <a:schemeClr val="lt1"/>
+          </a:fontRef>
+        </p:style>
+        <p:txBody>
+          <a:bodyPr rtlCol="0" anchor="ctr"/>
+          <a:lstStyle/>
+          <a:p>
+            <a:pPr algn="ctr"/>
+            <a:endParaRPr lang="en-US"/>
+          </a:p>
+        </p:txBody>
+      </p:sp>
+      <p:sp>
+        <p:nvSpPr>
+          <p:cNvPr id="105" name="Cylinder 104"/>
+          <p:cNvSpPr/>
+          <p:nvPr/>
+        </p:nvSpPr>
+        <p:spPr>
+          <a:xfrm>
+            <a:off x="4080551" y="1175457"/>
+            <a:ext cx="1784565" cy="1847440"/>
+          </a:xfrm>
+          <a:prstGeom prst="can">
+            <a:avLst/>
+          </a:prstGeom>
+        </p:spPr>
+        <p:style>
+          <a:lnRef idx="1">
+            <a:schemeClr val="accent1"/>
+          </a:lnRef>
+          <a:fillRef idx="3">
+            <a:schemeClr val="accent1"/>
+          </a:fillRef>
+          <a:effectRef idx="2">
+            <a:schemeClr val="accent1"/>
+          </a:effectRef>
+          <a:fontRef idx="minor">
+            <a:schemeClr val="lt1"/>
+          </a:fontRef>
+        </p:style>
+        <p:txBody>
+          <a:bodyPr rtlCol="0" anchor="ctr"/>
+          <a:lstStyle/>
+          <a:p>
+            <a:pPr algn="ctr"/>
+            <a:endParaRPr lang="en-US"/>
+          </a:p>
+        </p:txBody>
+      </p:sp>
+      <p:cxnSp>
+        <p:nvCxnSpPr>
+          <p:cNvPr id="56" name="Figur 52"/>
+          <p:cNvCxnSpPr/>
+          <p:nvPr/>
+        </p:nvCxnSpPr>
+        <p:spPr>
+          <a:xfrm rot="16200000" flipH="1">
+            <a:off x="3947728" y="3913964"/>
+            <a:ext cx="2971502" cy="1189369"/>
+          </a:xfrm>
+          <a:prstGeom prst="curvedConnector3">
+            <a:avLst>
+              <a:gd name="adj1" fmla="val 50000"/>
+            </a:avLst>
+          </a:prstGeom>
+          <a:ln>
+            <a:solidFill>
+              <a:srgbClr val="3366FF"/>
+            </a:solidFill>
+            <a:tailEnd type="arrow"/>
+          </a:ln>
+        </p:spPr>
+        <p:style>
+          <a:lnRef idx="2">
+            <a:schemeClr val="accent1"/>
+          </a:lnRef>
+          <a:fillRef idx="0">
+            <a:schemeClr val="accent1"/>
+          </a:fillRef>
+          <a:effectRef idx="1">
+            <a:schemeClr val="accent1"/>
+          </a:effectRef>
+          <a:fontRef idx="minor">
+            <a:schemeClr val="tx1"/>
+          </a:fontRef>
+        </p:style>
+      </p:cxnSp>
+      <p:sp>
+        <p:nvSpPr>
+          <p:cNvPr id="83" name="textruta 82"/>
+          <p:cNvSpPr txBox="1"/>
+          <p:nvPr/>
+        </p:nvSpPr>
+        <p:spPr>
+          <a:xfrm>
+            <a:off x="3071996" y="3447195"/>
+            <a:ext cx="3443330" cy="523220"/>
+          </a:xfrm>
+          <a:prstGeom prst="rect">
+            <a:avLst/>
+          </a:prstGeom>
+          <a:noFill/>
+          <a:ln>
+            <a:solidFill>
+              <a:schemeClr val="tx2">
+                <a:lumMod val="40000"/>
+                <a:lumOff val="60000"/>
+              </a:schemeClr>
+            </a:solidFill>
+          </a:ln>
+          <a:effectLst>
+            <a:glow rad="101600">
+              <a:schemeClr val="accent1">
+                <a:lumMod val="20000"/>
+                <a:lumOff val="80000"/>
+                <a:alpha val="75000"/>
+              </a:schemeClr>
+            </a:glow>
+            <a:outerShdw blurRad="50800" dist="38100" dir="2700000" algn="tl" rotWithShape="0">
+              <a:srgbClr val="000000">
+                <a:alpha val="43000"/>
+              </a:srgbClr>
+            </a:outerShdw>
+          </a:effectLst>
+        </p:spPr>
+        <p:txBody>
+          <a:bodyPr wrap="square" rtlCol="0">
+            <a:spAutoFit/>
+          </a:bodyPr>
+          <a:lstStyle/>
+          <a:p>
+            <a:r>
+              <a:rPr lang="en-US" sz="1400" dirty="0" smtClean="0">
+                <a:latin typeface="Arial"/>
+              </a:rPr>
+              <a:t>2: responds with list of SVN repositories</a:t>
+            </a:r>
+          </a:p>
+          <a:p>
+            <a:r>
+              <a:rPr lang="en-US" sz="1400" dirty="0" smtClean="0">
+                <a:latin typeface="Arial"/>
+              </a:rPr>
+              <a:t>6: respond with list of commits</a:t>
+            </a:r>
+            <a:endParaRPr lang="en-US" sz="1400" dirty="0">
+              <a:latin typeface="Arial"/>
+            </a:endParaRPr>
+          </a:p>
+        </p:txBody>
+      </p:sp>
+      <p:sp>
+        <p:nvSpPr>
+          <p:cNvPr id="104" name="Cylinder 103"/>
+          <p:cNvSpPr/>
+          <p:nvPr/>
+        </p:nvSpPr>
+        <p:spPr>
+          <a:xfrm>
+            <a:off x="7260822" y="1378161"/>
+            <a:ext cx="1784565" cy="1847440"/>
+          </a:xfrm>
+          <a:prstGeom prst="can">
+            <a:avLst/>
+          </a:prstGeom>
+          <a:ln>
+            <a:solidFill>
+              <a:schemeClr val="tx1"/>
+            </a:solidFill>
+          </a:ln>
+        </p:spPr>
+        <p:style>
+          <a:lnRef idx="1">
+            <a:schemeClr val="accent1"/>
+          </a:lnRef>
+          <a:fillRef idx="3">
+            <a:schemeClr val="accent1"/>
+          </a:fillRef>
+          <a:effectRef idx="2">
+            <a:schemeClr val="accent1"/>
+          </a:effectRef>
+          <a:fontRef idx="minor">
+            <a:schemeClr val="lt1"/>
+          </a:fontRef>
+        </p:style>
+        <p:txBody>
+          <a:bodyPr rtlCol="0" anchor="ctr"/>
+          <a:lstStyle/>
+          <a:p>
+            <a:pPr algn="ctr"/>
+            <a:endParaRPr lang="en-US"/>
+          </a:p>
+        </p:txBody>
+      </p:sp>
+      <p:sp>
+        <p:nvSpPr>
+          <p:cNvPr id="102" name="Cylinder 101"/>
+          <p:cNvSpPr/>
+          <p:nvPr/>
+        </p:nvSpPr>
+        <p:spPr>
+          <a:xfrm>
+            <a:off x="457200" y="1417638"/>
+            <a:ext cx="1784565" cy="3120267"/>
+          </a:xfrm>
+          <a:prstGeom prst="can">
+            <a:avLst/>
+          </a:prstGeom>
+        </p:spPr>
+        <p:style>
+          <a:lnRef idx="1">
+            <a:schemeClr val="accent1"/>
+          </a:lnRef>
+          <a:fillRef idx="3">
+            <a:schemeClr val="accent1"/>
+          </a:fillRef>
+          <a:effectRef idx="2">
+            <a:schemeClr val="accent1"/>
+          </a:effectRef>
+          <a:fontRef idx="minor">
+            <a:schemeClr val="lt1"/>
+          </a:fontRef>
+        </p:style>
+        <p:txBody>
+          <a:bodyPr rtlCol="0" anchor="ctr"/>
+          <a:lstStyle/>
+          <a:p>
+            <a:pPr algn="ctr"/>
+            <a:endParaRPr lang="en-US"/>
+          </a:p>
+        </p:txBody>
+      </p:sp>
+      <p:sp>
+        <p:nvSpPr>
           <p:cNvPr id="2" name="Rubrik 1"/>
           <p:cNvSpPr>
             <a:spLocks noGrp="1"/>
@@ -5042,145 +5298,1030 @@
             <p:ph type="title"/>
           </p:nvPr>
         </p:nvSpPr>
-        <p:spPr/>
-        <p:txBody>
-          <a:bodyPr/>
+        <p:spPr>
+          <a:xfrm>
+            <a:off x="457200" y="-1842"/>
+            <a:ext cx="8229600" cy="1143000"/>
+          </a:xfrm>
+        </p:spPr>
+        <p:txBody>
+          <a:bodyPr>
+            <a:normAutofit/>
+          </a:bodyPr>
           <a:lstStyle/>
           <a:p>
             <a:r>
               <a:rPr lang="en-US" dirty="0" smtClean="0"/>
-              <a:t>Installation</a:t>
+              <a:t>Sequence</a:t>
+            </a:r>
+            <a:r>
+              <a:rPr lang="en-US" dirty="0" smtClean="0"/>
+              <a:t> associating with commit</a:t>
             </a:r>
             <a:endParaRPr lang="en-US" dirty="0"/>
           </a:p>
         </p:txBody>
       </p:sp>
-      <p:sp>
-        <p:nvSpPr>
-          <p:cNvPr id="3" name="Platshållare för innehåll 2"/>
-          <p:cNvSpPr>
-            <a:spLocks noGrp="1"/>
-          </p:cNvSpPr>
-          <p:nvPr>
-            <p:ph idx="1"/>
-          </p:nvPr>
-        </p:nvSpPr>
-        <p:spPr/>
-        <p:txBody>
-          <a:bodyPr>
-            <a:normAutofit lnSpcReduction="10000"/>
+      <p:grpSp>
+        <p:nvGrpSpPr>
+          <p:cNvPr id="3" name="Grupp 22"/>
+          <p:cNvGrpSpPr/>
+          <p:nvPr/>
+        </p:nvGrpSpPr>
+        <p:grpSpPr>
+          <a:xfrm>
+            <a:off x="3974194" y="5399374"/>
+            <a:ext cx="1510618" cy="1190052"/>
+            <a:chOff x="717412" y="1559828"/>
+            <a:chExt cx="1510618" cy="1550276"/>
+          </a:xfrm>
+          <a:effectLst/>
+        </p:grpSpPr>
+        <p:cxnSp>
+          <p:nvCxnSpPr>
+            <p:cNvPr id="24" name="Rak 23"/>
+            <p:cNvCxnSpPr/>
+            <p:nvPr/>
+          </p:nvCxnSpPr>
+          <p:spPr>
+            <a:xfrm rot="5400000">
+              <a:off x="-56932" y="2334172"/>
+              <a:ext cx="1550276" cy="1588"/>
+            </a:xfrm>
+            <a:prstGeom prst="line">
+              <a:avLst/>
+            </a:prstGeom>
+          </p:spPr>
+          <p:style>
+            <a:lnRef idx="2">
+              <a:schemeClr val="accent1"/>
+            </a:lnRef>
+            <a:fillRef idx="0">
+              <a:schemeClr val="accent1"/>
+            </a:fillRef>
+            <a:effectRef idx="1">
+              <a:schemeClr val="accent1"/>
+            </a:effectRef>
+            <a:fontRef idx="minor">
+              <a:schemeClr val="tx1"/>
+            </a:fontRef>
+          </p:style>
+        </p:cxnSp>
+        <p:cxnSp>
+          <p:nvCxnSpPr>
+            <p:cNvPr id="25" name="Rak 24"/>
+            <p:cNvCxnSpPr/>
+            <p:nvPr/>
+          </p:nvCxnSpPr>
+          <p:spPr>
+            <a:xfrm rot="5400000">
+              <a:off x="1452098" y="2334172"/>
+              <a:ext cx="1550276" cy="1588"/>
+            </a:xfrm>
+            <a:prstGeom prst="line">
+              <a:avLst/>
+            </a:prstGeom>
+          </p:spPr>
+          <p:style>
+            <a:lnRef idx="2">
+              <a:schemeClr val="accent1"/>
+            </a:lnRef>
+            <a:fillRef idx="0">
+              <a:schemeClr val="accent1"/>
+            </a:fillRef>
+            <a:effectRef idx="1">
+              <a:schemeClr val="accent1"/>
+            </a:effectRef>
+            <a:fontRef idx="minor">
+              <a:schemeClr val="tx1"/>
+            </a:fontRef>
+          </p:style>
+        </p:cxnSp>
+        <p:cxnSp>
+          <p:nvCxnSpPr>
+            <p:cNvPr id="26" name="Rak 25"/>
+            <p:cNvCxnSpPr/>
+            <p:nvPr/>
+          </p:nvCxnSpPr>
+          <p:spPr>
+            <a:xfrm>
+              <a:off x="719000" y="3108516"/>
+              <a:ext cx="1507442" cy="1588"/>
+            </a:xfrm>
+            <a:prstGeom prst="line">
+              <a:avLst/>
+            </a:prstGeom>
+          </p:spPr>
+          <p:style>
+            <a:lnRef idx="2">
+              <a:schemeClr val="accent1"/>
+            </a:lnRef>
+            <a:fillRef idx="0">
+              <a:schemeClr val="accent1"/>
+            </a:fillRef>
+            <a:effectRef idx="1">
+              <a:schemeClr val="accent1"/>
+            </a:effectRef>
+            <a:fontRef idx="minor">
+              <a:schemeClr val="tx1"/>
+            </a:fontRef>
+          </p:style>
+        </p:cxnSp>
+        <p:cxnSp>
+          <p:nvCxnSpPr>
+            <p:cNvPr id="27" name="Rak 26"/>
+            <p:cNvCxnSpPr/>
+            <p:nvPr/>
+          </p:nvCxnSpPr>
+          <p:spPr>
+            <a:xfrm>
+              <a:off x="720588" y="1559828"/>
+              <a:ext cx="1507442" cy="1588"/>
+            </a:xfrm>
+            <a:prstGeom prst="line">
+              <a:avLst/>
+            </a:prstGeom>
+          </p:spPr>
+          <p:style>
+            <a:lnRef idx="2">
+              <a:schemeClr val="accent1"/>
+            </a:lnRef>
+            <a:fillRef idx="0">
+              <a:schemeClr val="accent1"/>
+            </a:fillRef>
+            <a:effectRef idx="1">
+              <a:schemeClr val="accent1"/>
+            </a:effectRef>
+            <a:fontRef idx="minor">
+              <a:schemeClr val="tx1"/>
+            </a:fontRef>
+          </p:style>
+        </p:cxnSp>
+      </p:grpSp>
+      <p:sp>
+        <p:nvSpPr>
+          <p:cNvPr id="33" name="textruta 32"/>
+          <p:cNvSpPr txBox="1"/>
+          <p:nvPr/>
+        </p:nvSpPr>
+        <p:spPr>
+          <a:xfrm>
+            <a:off x="622829" y="1422069"/>
+            <a:ext cx="1223412" cy="369332"/>
+          </a:xfrm>
+          <a:prstGeom prst="rect">
+            <a:avLst/>
+          </a:prstGeom>
+          <a:noFill/>
+        </p:spPr>
+        <p:txBody>
+          <a:bodyPr wrap="none" rtlCol="0">
+            <a:spAutoFit/>
           </a:bodyPr>
           <a:lstStyle/>
           <a:p>
             <a:r>
+              <a:rPr lang="en-US" u="sng" dirty="0" smtClean="0"/>
+              <a:t>SVN Server</a:t>
+            </a:r>
+            <a:endParaRPr lang="en-US" u="sng" dirty="0"/>
+          </a:p>
+        </p:txBody>
+      </p:sp>
+      <p:sp>
+        <p:nvSpPr>
+          <p:cNvPr id="34" name="textruta 33"/>
+          <p:cNvSpPr txBox="1"/>
+          <p:nvPr/>
+        </p:nvSpPr>
+        <p:spPr>
+          <a:xfrm>
+            <a:off x="622828" y="2156091"/>
+            <a:ext cx="1223413" cy="369332"/>
+          </a:xfrm>
+          <a:prstGeom prst="rect">
+            <a:avLst/>
+          </a:prstGeom>
+          <a:noFill/>
+          <a:ln w="15875">
+            <a:solidFill>
+              <a:schemeClr val="tx1"/>
+            </a:solidFill>
+          </a:ln>
+        </p:spPr>
+        <p:txBody>
+          <a:bodyPr wrap="square" rtlCol="0">
+            <a:spAutoFit/>
+          </a:bodyPr>
+          <a:lstStyle/>
+          <a:p>
+            <a:r>
               <a:rPr lang="en-US" dirty="0" smtClean="0"/>
-              <a:t>On the </a:t>
+              <a:t>SVN serve</a:t>
+            </a:r>
+            <a:endParaRPr lang="en-US" dirty="0"/>
+          </a:p>
+        </p:txBody>
+      </p:sp>
+      <p:sp>
+        <p:nvSpPr>
+          <p:cNvPr id="35" name="textruta 34"/>
+          <p:cNvSpPr txBox="1"/>
+          <p:nvPr/>
+        </p:nvSpPr>
+        <p:spPr>
+          <a:xfrm>
+            <a:off x="618168" y="3047084"/>
+            <a:ext cx="1019694" cy="923330"/>
+          </a:xfrm>
+          <a:prstGeom prst="rect">
+            <a:avLst/>
+          </a:prstGeom>
+          <a:noFill/>
+          <a:ln w="15875">
+            <a:solidFill>
+              <a:schemeClr val="tx1"/>
+            </a:solidFill>
+          </a:ln>
+        </p:spPr>
+        <p:txBody>
+          <a:bodyPr wrap="square" rtlCol="0">
+            <a:spAutoFit/>
+          </a:bodyPr>
+          <a:lstStyle/>
+          <a:p>
+            <a:r>
+              <a:rPr lang="en-US" dirty="0" smtClean="0"/>
+              <a:t>annotation  </a:t>
+            </a:r>
+            <a:r>
+              <a:rPr lang="en-US" dirty="0"/>
+              <a:t>server</a:t>
+            </a:r>
+          </a:p>
+        </p:txBody>
+      </p:sp>
+      <p:sp>
+        <p:nvSpPr>
+          <p:cNvPr id="36" name="textruta 35"/>
+          <p:cNvSpPr txBox="1"/>
+          <p:nvPr/>
+        </p:nvSpPr>
+        <p:spPr>
+          <a:xfrm>
+            <a:off x="7475727" y="1422069"/>
+            <a:ext cx="1569660" cy="369332"/>
+          </a:xfrm>
+          <a:prstGeom prst="rect">
+            <a:avLst/>
+          </a:prstGeom>
+          <a:noFill/>
+        </p:spPr>
+        <p:txBody>
+          <a:bodyPr wrap="none" rtlCol="0">
+            <a:spAutoFit/>
+          </a:bodyPr>
+          <a:lstStyle/>
+          <a:p>
+            <a:r>
+              <a:rPr lang="en-US" u="sng" dirty="0" err="1" smtClean="0"/>
+              <a:t>Hansoft</a:t>
+            </a:r>
+            <a:r>
+              <a:rPr lang="en-US" u="sng" dirty="0" smtClean="0"/>
+              <a:t> Server</a:t>
+            </a:r>
+            <a:endParaRPr lang="en-US" u="sng" dirty="0"/>
+          </a:p>
+        </p:txBody>
+      </p:sp>
+      <p:sp>
+        <p:nvSpPr>
+          <p:cNvPr id="37" name="textruta 36"/>
+          <p:cNvSpPr txBox="1"/>
+          <p:nvPr/>
+        </p:nvSpPr>
+        <p:spPr>
+          <a:xfrm>
+            <a:off x="3996209" y="1232972"/>
+            <a:ext cx="1871275" cy="369332"/>
+          </a:xfrm>
+          <a:prstGeom prst="rect">
+            <a:avLst/>
+          </a:prstGeom>
+          <a:noFill/>
+        </p:spPr>
+        <p:txBody>
+          <a:bodyPr wrap="none" rtlCol="0">
+            <a:spAutoFit/>
+          </a:bodyPr>
+          <a:lstStyle/>
+          <a:p>
+            <a:r>
+              <a:rPr lang="en-US" u="sng" dirty="0" smtClean="0"/>
+              <a:t>Integration Server</a:t>
+            </a:r>
+            <a:endParaRPr lang="en-US" u="sng" dirty="0"/>
+          </a:p>
+        </p:txBody>
+      </p:sp>
+      <p:sp>
+        <p:nvSpPr>
+          <p:cNvPr id="38" name="textruta 37"/>
+          <p:cNvSpPr txBox="1"/>
+          <p:nvPr/>
+        </p:nvSpPr>
+        <p:spPr>
+          <a:xfrm>
+            <a:off x="3640083" y="4466406"/>
+            <a:ext cx="1580143" cy="369332"/>
+          </a:xfrm>
+          <a:prstGeom prst="rect">
+            <a:avLst/>
+          </a:prstGeom>
+          <a:noFill/>
+        </p:spPr>
+        <p:txBody>
+          <a:bodyPr wrap="square" rtlCol="0">
+            <a:spAutoFit/>
+          </a:bodyPr>
+          <a:lstStyle/>
+          <a:p>
+            <a:r>
+              <a:rPr lang="en-US" u="sng" dirty="0" smtClean="0"/>
+              <a:t>Client machine</a:t>
+            </a:r>
+            <a:endParaRPr lang="en-US" u="sng" dirty="0"/>
+          </a:p>
+        </p:txBody>
+      </p:sp>
+      <p:sp>
+        <p:nvSpPr>
+          <p:cNvPr id="40" name="textruta 39"/>
+          <p:cNvSpPr txBox="1"/>
+          <p:nvPr/>
+        </p:nvSpPr>
+        <p:spPr>
+          <a:xfrm>
+            <a:off x="4806427" y="5994400"/>
+            <a:ext cx="1353593" cy="369332"/>
+          </a:xfrm>
+          <a:prstGeom prst="rect">
+            <a:avLst/>
+          </a:prstGeom>
+          <a:noFill/>
+          <a:ln w="15875">
+            <a:solidFill>
+              <a:schemeClr val="tx1"/>
+            </a:solidFill>
+          </a:ln>
+        </p:spPr>
+        <p:txBody>
+          <a:bodyPr wrap="square" rtlCol="0">
+            <a:spAutoFit/>
+          </a:bodyPr>
+          <a:lstStyle/>
+          <a:p>
+            <a:r>
+              <a:rPr lang="en-US" dirty="0" smtClean="0"/>
+              <a:t>Client </a:t>
             </a:r>
             <a:r>
               <a:rPr lang="en-US" dirty="0" err="1" smtClean="0"/>
+              <a:t>Plugin</a:t>
+            </a:r>
+            <a:endParaRPr lang="en-US" dirty="0"/>
+          </a:p>
+        </p:txBody>
+      </p:sp>
+      <p:sp>
+        <p:nvSpPr>
+          <p:cNvPr id="43" name="textruta 42"/>
+          <p:cNvSpPr txBox="1"/>
+          <p:nvPr/>
+        </p:nvSpPr>
+        <p:spPr>
+          <a:xfrm>
+            <a:off x="622829" y="2598582"/>
+            <a:ext cx="1223412" cy="369332"/>
+          </a:xfrm>
+          <a:prstGeom prst="rect">
+            <a:avLst/>
+          </a:prstGeom>
+          <a:noFill/>
+          <a:ln w="15875">
+            <a:solidFill>
+              <a:schemeClr val="tx1"/>
+            </a:solidFill>
+          </a:ln>
+        </p:spPr>
+        <p:txBody>
+          <a:bodyPr wrap="square" rtlCol="0">
+            <a:spAutoFit/>
+          </a:bodyPr>
+          <a:lstStyle/>
+          <a:p>
+            <a:r>
+              <a:rPr lang="en-US" dirty="0" err="1" smtClean="0"/>
+              <a:t>svnhook</a:t>
+            </a:r>
+            <a:endParaRPr lang="en-US" dirty="0"/>
+          </a:p>
+        </p:txBody>
+      </p:sp>
+      <p:sp>
+        <p:nvSpPr>
+          <p:cNvPr id="48" name="textruta 47"/>
+          <p:cNvSpPr txBox="1"/>
+          <p:nvPr/>
+        </p:nvSpPr>
+        <p:spPr>
+          <a:xfrm>
+            <a:off x="4085295" y="5452100"/>
+            <a:ext cx="1506993" cy="369332"/>
+          </a:xfrm>
+          <a:prstGeom prst="rect">
+            <a:avLst/>
+          </a:prstGeom>
+          <a:noFill/>
+        </p:spPr>
+        <p:txBody>
+          <a:bodyPr wrap="none" rtlCol="0">
+            <a:spAutoFit/>
+          </a:bodyPr>
+          <a:lstStyle/>
+          <a:p>
+            <a:r>
+              <a:rPr lang="en-US" u="sng" dirty="0" err="1" smtClean="0"/>
               <a:t>Hansoft</a:t>
             </a:r>
             <a:r>
+              <a:rPr lang="en-US" u="sng" dirty="0" smtClean="0"/>
+              <a:t> Client</a:t>
+            </a:r>
+            <a:endParaRPr lang="en-US" u="sng" dirty="0"/>
+          </a:p>
+        </p:txBody>
+      </p:sp>
+      <p:sp>
+        <p:nvSpPr>
+          <p:cNvPr id="49" name="textruta 48"/>
+          <p:cNvSpPr txBox="1"/>
+          <p:nvPr/>
+        </p:nvSpPr>
+        <p:spPr>
+          <a:xfrm>
+            <a:off x="3071996" y="4898102"/>
+            <a:ext cx="1136173" cy="369332"/>
+          </a:xfrm>
+          <a:prstGeom prst="rect">
+            <a:avLst/>
+          </a:prstGeom>
+          <a:noFill/>
+          <a:ln w="15875">
+            <a:solidFill>
+              <a:schemeClr val="tx1"/>
+            </a:solidFill>
+          </a:ln>
+        </p:spPr>
+        <p:txBody>
+          <a:bodyPr wrap="square" rtlCol="0">
+            <a:spAutoFit/>
+          </a:bodyPr>
+          <a:lstStyle/>
+          <a:p>
+            <a:r>
               <a:rPr lang="en-US" dirty="0" smtClean="0"/>
-              <a:t> server:</a:t>
-            </a:r>
-          </a:p>
-          <a:p>
-            <a:pPr lvl="1"/>
-            <a:r>
-              <a:rPr lang="en-US" dirty="0" smtClean="0"/>
-              <a:t>Run “</a:t>
-            </a:r>
-            <a:r>
-              <a:rPr lang="en-US" dirty="0" err="1" smtClean="0"/>
-              <a:t>HansoftSVNPusher</a:t>
-            </a:r>
-            <a:r>
-              <a:rPr lang="en-US" dirty="0" smtClean="0"/>
-              <a:t>” to upload the </a:t>
-            </a:r>
-            <a:r>
-              <a:rPr lang="en-US" dirty="0" err="1" smtClean="0"/>
-              <a:t>Hansoft</a:t>
-            </a:r>
-            <a:r>
-              <a:rPr lang="en-US" dirty="0" smtClean="0"/>
-              <a:t>/SVN client plug-in</a:t>
-            </a:r>
-          </a:p>
-          <a:p>
-            <a:r>
-              <a:rPr lang="en-US" dirty="0" smtClean="0"/>
-              <a:t>On the SVN server:</a:t>
-            </a:r>
-          </a:p>
-          <a:p>
-            <a:pPr lvl="1"/>
-            <a:r>
-              <a:rPr lang="en-US" dirty="0" smtClean="0"/>
-              <a:t>Configure the post-commit hook to invoke the script ”</a:t>
-            </a:r>
-            <a:r>
-              <a:rPr lang="en-US" dirty="0" err="1" smtClean="0"/>
-              <a:t>hansoftclient.py</a:t>
-            </a:r>
-            <a:r>
-              <a:rPr lang="en-US" dirty="0" smtClean="0"/>
-              <a:t>” – details, see TBD</a:t>
-            </a:r>
-            <a:endParaRPr lang="en-US" dirty="0" smtClean="0"/>
-          </a:p>
-          <a:p>
-            <a:r>
-              <a:rPr lang="en-US" dirty="0" smtClean="0"/>
-              <a:t>Deploy </a:t>
-            </a:r>
-            <a:r>
-              <a:rPr lang="en-US" dirty="0" smtClean="0"/>
-              <a:t>the ”</a:t>
-            </a:r>
-            <a:r>
-              <a:rPr lang="en-US" dirty="0" err="1" smtClean="0"/>
-              <a:t>hansoft</a:t>
-            </a:r>
-            <a:r>
-              <a:rPr lang="en-US" dirty="0" smtClean="0"/>
-              <a:t>-integration” package</a:t>
-            </a:r>
-            <a:r>
-              <a:rPr lang="en-US" dirty="0" smtClean="0"/>
-              <a:t> </a:t>
-            </a:r>
-          </a:p>
-          <a:p>
-            <a:pPr lvl="1"/>
-            <a:r>
-              <a:rPr lang="en-US" dirty="0" smtClean="0"/>
-              <a:t>Configure the </a:t>
-            </a:r>
-            <a:r>
-              <a:rPr lang="en-US" dirty="0" err="1" smtClean="0"/>
-              <a:t>server.properties</a:t>
-            </a:r>
-            <a:r>
-              <a:rPr lang="en-US" dirty="0" smtClean="0"/>
-              <a:t> file</a:t>
-            </a:r>
-          </a:p>
-          <a:p>
-            <a:pPr lvl="1"/>
-            <a:r>
-              <a:rPr lang="en-US" dirty="0" smtClean="0"/>
-              <a:t>Launch using </a:t>
-            </a:r>
-            <a:r>
-              <a:rPr lang="en-US" dirty="0" err="1" smtClean="0"/>
-              <a:t>integrationserver.sh</a:t>
-            </a:r>
-            <a:r>
-              <a:rPr lang="en-US" dirty="0" smtClean="0"/>
-              <a:t>/.bat</a:t>
-            </a:r>
+              <a:t>SVN client</a:t>
+            </a:r>
+          </a:p>
+        </p:txBody>
+      </p:sp>
+      <p:grpSp>
+        <p:nvGrpSpPr>
+          <p:cNvPr id="5" name="Grupp 95"/>
+          <p:cNvGrpSpPr/>
+          <p:nvPr/>
+        </p:nvGrpSpPr>
+        <p:grpSpPr>
+          <a:xfrm>
+            <a:off x="1846241" y="1602305"/>
+            <a:ext cx="2960186" cy="1180943"/>
+            <a:chOff x="1846241" y="1602305"/>
+            <a:chExt cx="2839277" cy="1180943"/>
+          </a:xfrm>
+        </p:grpSpPr>
+        <p:cxnSp>
+          <p:nvCxnSpPr>
+            <p:cNvPr id="53" name="Figur 52"/>
+            <p:cNvCxnSpPr>
+              <a:stCxn id="43" idx="3"/>
+            </p:cNvCxnSpPr>
+            <p:nvPr/>
+          </p:nvCxnSpPr>
+          <p:spPr>
+            <a:xfrm flipV="1">
+              <a:off x="1846241" y="2156091"/>
+              <a:ext cx="2147600" cy="627157"/>
+            </a:xfrm>
+            <a:prstGeom prst="curvedConnector3">
+              <a:avLst>
+                <a:gd name="adj1" fmla="val 50000"/>
+              </a:avLst>
+            </a:prstGeom>
+            <a:ln>
+              <a:solidFill>
+                <a:srgbClr val="3366FF"/>
+              </a:solidFill>
+              <a:tailEnd type="arrow"/>
+            </a:ln>
+          </p:spPr>
+          <p:style>
+            <a:lnRef idx="2">
+              <a:schemeClr val="accent1"/>
+            </a:lnRef>
+            <a:fillRef idx="0">
+              <a:schemeClr val="accent1"/>
+            </a:fillRef>
+            <a:effectRef idx="1">
+              <a:schemeClr val="accent1"/>
+            </a:effectRef>
+            <a:fontRef idx="minor">
+              <a:schemeClr val="tx1"/>
+            </a:fontRef>
+          </p:style>
+        </p:cxnSp>
+        <p:sp>
+          <p:nvSpPr>
+            <p:cNvPr id="80" name="textruta 79"/>
+            <p:cNvSpPr txBox="1"/>
+            <p:nvPr/>
+          </p:nvSpPr>
+          <p:spPr>
+            <a:xfrm>
+              <a:off x="2155542" y="1602305"/>
+              <a:ext cx="2529976" cy="307777"/>
+            </a:xfrm>
+            <a:prstGeom prst="rect">
+              <a:avLst/>
+            </a:prstGeom>
+            <a:noFill/>
+          </p:spPr>
+          <p:txBody>
+            <a:bodyPr wrap="square" rtlCol="0">
+              <a:spAutoFit/>
+            </a:bodyPr>
+            <a:lstStyle/>
+            <a:p>
+              <a:r>
+                <a:rPr lang="en-US" sz="1400" dirty="0" smtClean="0">
+                  <a:latin typeface="Arial"/>
+                </a:rPr>
+                <a:t>5: respond with list of commits</a:t>
+              </a:r>
+            </a:p>
+          </p:txBody>
+        </p:sp>
+      </p:grpSp>
+      <p:grpSp>
+        <p:nvGrpSpPr>
+          <p:cNvPr id="6" name="Grupp 97"/>
+          <p:cNvGrpSpPr/>
+          <p:nvPr/>
+        </p:nvGrpSpPr>
+        <p:grpSpPr>
+          <a:xfrm>
+            <a:off x="5601155" y="2966326"/>
+            <a:ext cx="3539725" cy="3212740"/>
+            <a:chOff x="5601155" y="2966326"/>
+            <a:chExt cx="3539725" cy="3212740"/>
+          </a:xfrm>
+        </p:grpSpPr>
+        <p:cxnSp>
+          <p:nvCxnSpPr>
+            <p:cNvPr id="62" name="Figur 52"/>
+            <p:cNvCxnSpPr>
+              <a:stCxn id="40" idx="3"/>
+            </p:cNvCxnSpPr>
+            <p:nvPr/>
+          </p:nvCxnSpPr>
+          <p:spPr>
+            <a:xfrm flipH="1" flipV="1">
+              <a:off x="5601155" y="2966326"/>
+              <a:ext cx="558865" cy="3212740"/>
+            </a:xfrm>
+            <a:prstGeom prst="curvedConnector4">
+              <a:avLst>
+                <a:gd name="adj1" fmla="val -40904"/>
+                <a:gd name="adj2" fmla="val 52874"/>
+              </a:avLst>
+            </a:prstGeom>
+            <a:ln>
+              <a:solidFill>
+                <a:srgbClr val="3366FF"/>
+              </a:solidFill>
+              <a:tailEnd type="arrow"/>
+            </a:ln>
+          </p:spPr>
+          <p:style>
+            <a:lnRef idx="2">
+              <a:schemeClr val="accent1"/>
+            </a:lnRef>
+            <a:fillRef idx="0">
+              <a:schemeClr val="accent1"/>
+            </a:fillRef>
+            <a:effectRef idx="1">
+              <a:schemeClr val="accent1"/>
+            </a:effectRef>
+            <a:fontRef idx="minor">
+              <a:schemeClr val="tx1"/>
+            </a:fontRef>
+          </p:style>
+        </p:cxnSp>
+        <p:sp>
+          <p:nvSpPr>
+            <p:cNvPr id="81" name="textruta 80"/>
+            <p:cNvSpPr txBox="1"/>
+            <p:nvPr/>
+          </p:nvSpPr>
+          <p:spPr>
+            <a:xfrm>
+              <a:off x="5793289" y="4220993"/>
+              <a:ext cx="3347591" cy="738664"/>
+            </a:xfrm>
+            <a:prstGeom prst="rect">
+              <a:avLst/>
+            </a:prstGeom>
+            <a:noFill/>
+          </p:spPr>
+          <p:txBody>
+            <a:bodyPr wrap="none" rtlCol="0">
+              <a:spAutoFit/>
+            </a:bodyPr>
+            <a:lstStyle/>
+            <a:p>
+              <a:r>
+                <a:rPr lang="en-US" sz="1400" dirty="0" smtClean="0">
+                  <a:latin typeface="Arial"/>
+                </a:rPr>
+                <a:t>1: request list of SVN repositories</a:t>
+              </a:r>
+            </a:p>
+            <a:p>
+              <a:r>
+                <a:rPr lang="en-US" sz="1400" dirty="0" smtClean="0">
+                  <a:latin typeface="Arial"/>
+                </a:rPr>
+                <a:t>3: </a:t>
+              </a:r>
+              <a:r>
+                <a:rPr lang="en-US" sz="1400" dirty="0" smtClean="0">
+                  <a:latin typeface="Arial"/>
+                </a:rPr>
+                <a:t>request list of SVN commits</a:t>
+              </a:r>
+              <a:r>
+                <a:rPr lang="en-US" sz="1400" dirty="0" smtClean="0">
+                  <a:latin typeface="Arial"/>
+                </a:rPr>
+                <a:t> </a:t>
+              </a:r>
+            </a:p>
+            <a:p>
+              <a:r>
+                <a:rPr lang="en-US" sz="1400" dirty="0" smtClean="0">
+                  <a:latin typeface="Arial"/>
+                </a:rPr>
+                <a:t>7</a:t>
+              </a:r>
+              <a:r>
+                <a:rPr lang="en-US" sz="1400" dirty="0" smtClean="0">
+                  <a:latin typeface="Arial"/>
+                </a:rPr>
+                <a:t>: </a:t>
+              </a:r>
+              <a:r>
+                <a:rPr lang="en-US" sz="1400" dirty="0" smtClean="0">
+                  <a:latin typeface="Arial"/>
+                </a:rPr>
+                <a:t>respond </a:t>
+              </a:r>
+              <a:r>
+                <a:rPr lang="en-US" sz="1400" dirty="0" smtClean="0">
+                  <a:latin typeface="Arial"/>
+                </a:rPr>
+                <a:t>with </a:t>
+              </a:r>
+              <a:r>
+                <a:rPr lang="en-US" sz="1400" dirty="0" smtClean="0">
+                  <a:latin typeface="Arial"/>
+                </a:rPr>
+                <a:t>selection (item, commit)</a:t>
+              </a:r>
+              <a:endParaRPr lang="en-US" sz="1400" dirty="0">
+                <a:latin typeface="Arial"/>
+              </a:endParaRPr>
+            </a:p>
+          </p:txBody>
+        </p:sp>
+      </p:grpSp>
+      <p:grpSp>
+        <p:nvGrpSpPr>
+          <p:cNvPr id="7" name="Grupp 98"/>
+          <p:cNvGrpSpPr/>
+          <p:nvPr/>
+        </p:nvGrpSpPr>
+        <p:grpSpPr>
+          <a:xfrm>
+            <a:off x="5865116" y="1791400"/>
+            <a:ext cx="1727151" cy="549356"/>
+            <a:chOff x="6028165" y="1791400"/>
+            <a:chExt cx="1564102" cy="549356"/>
+          </a:xfrm>
+        </p:grpSpPr>
+        <p:cxnSp>
+          <p:nvCxnSpPr>
+            <p:cNvPr id="68" name="Figur 52"/>
+            <p:cNvCxnSpPr/>
+            <p:nvPr/>
+          </p:nvCxnSpPr>
+          <p:spPr>
+            <a:xfrm>
+              <a:off x="6028165" y="2156091"/>
+              <a:ext cx="1450738" cy="184665"/>
+            </a:xfrm>
+            <a:prstGeom prst="curvedConnector3">
+              <a:avLst>
+                <a:gd name="adj1" fmla="val 50000"/>
+              </a:avLst>
+            </a:prstGeom>
+            <a:ln>
+              <a:solidFill>
+                <a:srgbClr val="3366FF"/>
+              </a:solidFill>
+              <a:tailEnd type="arrow"/>
+            </a:ln>
+          </p:spPr>
+          <p:style>
+            <a:lnRef idx="2">
+              <a:schemeClr val="accent1"/>
+            </a:lnRef>
+            <a:fillRef idx="0">
+              <a:schemeClr val="accent1"/>
+            </a:fillRef>
+            <a:effectRef idx="1">
+              <a:schemeClr val="accent1"/>
+            </a:effectRef>
+            <a:fontRef idx="minor">
+              <a:schemeClr val="tx1"/>
+            </a:fontRef>
+          </p:style>
+        </p:cxnSp>
+        <p:sp>
+          <p:nvSpPr>
+            <p:cNvPr id="82" name="textruta 81"/>
+            <p:cNvSpPr txBox="1"/>
+            <p:nvPr/>
+          </p:nvSpPr>
+          <p:spPr>
+            <a:xfrm>
+              <a:off x="6030309" y="1791400"/>
+              <a:ext cx="1561958" cy="307777"/>
+            </a:xfrm>
+            <a:prstGeom prst="rect">
+              <a:avLst/>
+            </a:prstGeom>
+            <a:noFill/>
+          </p:spPr>
+          <p:txBody>
+            <a:bodyPr wrap="square" rtlCol="0">
+              <a:spAutoFit/>
+            </a:bodyPr>
+            <a:lstStyle/>
+            <a:p>
+              <a:r>
+                <a:rPr lang="en-US" sz="1400" dirty="0" smtClean="0">
+                  <a:latin typeface="Arial"/>
+                </a:rPr>
+                <a:t>9</a:t>
+              </a:r>
+              <a:r>
+                <a:rPr lang="en-US" sz="1400" dirty="0" smtClean="0">
+                  <a:latin typeface="Arial"/>
+                </a:rPr>
+                <a:t>: </a:t>
+              </a:r>
+              <a:r>
+                <a:rPr lang="en-US" sz="1400" dirty="0" smtClean="0">
+                  <a:latin typeface="Arial"/>
+                </a:rPr>
+                <a:t>annotate </a:t>
+              </a:r>
+              <a:r>
+                <a:rPr lang="en-US" sz="1400" dirty="0" smtClean="0">
+                  <a:latin typeface="Arial"/>
+                </a:rPr>
+                <a:t>item</a:t>
+              </a:r>
+              <a:endParaRPr lang="en-US" sz="1400" dirty="0">
+                <a:latin typeface="Arial"/>
+              </a:endParaRPr>
+            </a:p>
+          </p:txBody>
+        </p:sp>
+      </p:grpSp>
+      <p:grpSp>
+        <p:nvGrpSpPr>
+          <p:cNvPr id="9" name="Grupp 100"/>
+          <p:cNvGrpSpPr/>
+          <p:nvPr/>
+        </p:nvGrpSpPr>
+        <p:grpSpPr>
+          <a:xfrm>
+            <a:off x="457199" y="2340758"/>
+            <a:ext cx="1711514" cy="2926676"/>
+            <a:chOff x="457199" y="2340758"/>
+            <a:chExt cx="1711514" cy="2926676"/>
+          </a:xfrm>
+        </p:grpSpPr>
+        <p:cxnSp>
+          <p:nvCxnSpPr>
+            <p:cNvPr id="74" name="Figur 52"/>
+            <p:cNvCxnSpPr>
+              <a:stCxn id="35" idx="2"/>
+              <a:endCxn id="34" idx="1"/>
+            </p:cNvCxnSpPr>
+            <p:nvPr/>
+          </p:nvCxnSpPr>
+          <p:spPr>
+            <a:xfrm rot="5400000" flipH="1">
+              <a:off x="60593" y="2902993"/>
+              <a:ext cx="1629657" cy="505187"/>
+            </a:xfrm>
+            <a:prstGeom prst="curvedConnector4">
+              <a:avLst>
+                <a:gd name="adj1" fmla="val -14027"/>
+                <a:gd name="adj2" fmla="val 146173"/>
+              </a:avLst>
+            </a:prstGeom>
+            <a:ln>
+              <a:solidFill>
+                <a:srgbClr val="3366FF"/>
+              </a:solidFill>
+              <a:tailEnd type="arrow"/>
+            </a:ln>
+          </p:spPr>
+          <p:style>
+            <a:lnRef idx="2">
+              <a:schemeClr val="accent1"/>
+            </a:lnRef>
+            <a:fillRef idx="0">
+              <a:schemeClr val="accent1"/>
+            </a:fillRef>
+            <a:effectRef idx="1">
+              <a:schemeClr val="accent1"/>
+            </a:effectRef>
+            <a:fontRef idx="minor">
+              <a:schemeClr val="tx1"/>
+            </a:fontRef>
+          </p:style>
+        </p:cxnSp>
+        <p:sp>
+          <p:nvSpPr>
+            <p:cNvPr id="84" name="textruta 83"/>
+            <p:cNvSpPr txBox="1"/>
+            <p:nvPr/>
+          </p:nvSpPr>
+          <p:spPr>
+            <a:xfrm>
+              <a:off x="457199" y="4959657"/>
+              <a:ext cx="1711514" cy="307777"/>
+            </a:xfrm>
+            <a:prstGeom prst="rect">
+              <a:avLst/>
+            </a:prstGeom>
+            <a:noFill/>
+          </p:spPr>
+          <p:txBody>
+            <a:bodyPr wrap="none" rtlCol="0">
+              <a:spAutoFit/>
+            </a:bodyPr>
+            <a:lstStyle/>
+            <a:p>
+              <a:r>
+                <a:rPr lang="en-US" sz="1400" dirty="0" smtClean="0">
+                  <a:latin typeface="Arial"/>
+                </a:rPr>
+                <a:t>8</a:t>
+              </a:r>
+              <a:r>
+                <a:rPr lang="en-US" sz="1400" dirty="0" smtClean="0">
+                  <a:latin typeface="Arial"/>
+                </a:rPr>
+                <a:t>: </a:t>
+              </a:r>
+              <a:r>
+                <a:rPr lang="en-US" sz="1400" dirty="0" smtClean="0">
+                  <a:latin typeface="Arial"/>
+                </a:rPr>
+                <a:t>annotate commit</a:t>
+              </a:r>
+              <a:endParaRPr lang="en-US" sz="1400" dirty="0">
+                <a:latin typeface="Arial"/>
+              </a:endParaRPr>
+            </a:p>
+          </p:txBody>
+        </p:sp>
+      </p:grpSp>
+      <p:cxnSp>
+        <p:nvCxnSpPr>
+          <p:cNvPr id="71" name="Figur 52"/>
+          <p:cNvCxnSpPr/>
+          <p:nvPr/>
+        </p:nvCxnSpPr>
+        <p:spPr>
+          <a:xfrm rot="10800000" flipV="1">
+            <a:off x="1637863" y="2598581"/>
+            <a:ext cx="2470491" cy="1062521"/>
+          </a:xfrm>
+          <a:prstGeom prst="curvedConnector3">
+            <a:avLst>
+              <a:gd name="adj1" fmla="val 50000"/>
+            </a:avLst>
+          </a:prstGeom>
+          <a:ln>
+            <a:solidFill>
+              <a:srgbClr val="3366FF"/>
+            </a:solidFill>
+            <a:tailEnd type="arrow"/>
+          </a:ln>
+        </p:spPr>
+        <p:style>
+          <a:lnRef idx="2">
+            <a:schemeClr val="accent1"/>
+          </a:lnRef>
+          <a:fillRef idx="0">
+            <a:schemeClr val="accent1"/>
+          </a:fillRef>
+          <a:effectRef idx="1">
+            <a:schemeClr val="accent1"/>
+          </a:effectRef>
+          <a:fontRef idx="minor">
+            <a:schemeClr val="tx1"/>
+          </a:fontRef>
+        </p:style>
+      </p:cxnSp>
+      <p:sp>
+        <p:nvSpPr>
+          <p:cNvPr id="85" name="textruta 84"/>
+          <p:cNvSpPr txBox="1"/>
+          <p:nvPr/>
+        </p:nvSpPr>
+        <p:spPr>
+          <a:xfrm>
+            <a:off x="2168713" y="2785474"/>
+            <a:ext cx="2794250" cy="523220"/>
+          </a:xfrm>
+          <a:prstGeom prst="rect">
+            <a:avLst/>
+          </a:prstGeom>
+          <a:noFill/>
+        </p:spPr>
+        <p:txBody>
+          <a:bodyPr wrap="square" rtlCol="0">
+            <a:spAutoFit/>
+          </a:bodyPr>
+          <a:lstStyle/>
+          <a:p>
+            <a:r>
+              <a:rPr lang="en-US" sz="1400" dirty="0" smtClean="0">
+                <a:latin typeface="Arial"/>
+              </a:rPr>
+              <a:t>4: request list of SVN commits</a:t>
+            </a:r>
+          </a:p>
+          <a:p>
+            <a:r>
+              <a:rPr lang="en-US" sz="1400" dirty="0" smtClean="0">
+                <a:latin typeface="Arial"/>
+              </a:rPr>
+              <a:t>7</a:t>
+            </a:r>
+            <a:r>
+              <a:rPr lang="en-US" sz="1400" dirty="0" smtClean="0">
+                <a:latin typeface="Arial"/>
+              </a:rPr>
+              <a:t>: </a:t>
+            </a:r>
+            <a:r>
+              <a:rPr lang="en-US" sz="1400" dirty="0" smtClean="0">
+                <a:latin typeface="Arial"/>
+              </a:rPr>
+              <a:t>annotate commit</a:t>
+            </a:r>
+            <a:endParaRPr lang="en-US" sz="1400" dirty="0">
+              <a:latin typeface="Arial"/>
+            </a:endParaRPr>
           </a:p>
         </p:txBody>
       </p:sp>
@@ -5189,6 +6330,9 @@
   <p:clrMapOvr>
     <a:masterClrMapping/>
   </p:clrMapOvr>
+  <p:transition>
+    <p:fade/>
+  </p:transition>
   <p:timing>
     <p:tnLst>
       <p:par>
@@ -5232,10 +6376,10 @@
           <a:lstStyle/>
           <a:p>
             <a:r>
-              <a:rPr lang="en-US" smtClean="0"/>
-              <a:t>Configuration</a:t>
-            </a:r>
-            <a:endParaRPr lang="en-US"/>
+              <a:rPr lang="en-US" dirty="0" smtClean="0"/>
+              <a:t>Installation</a:t>
+            </a:r>
+            <a:endParaRPr lang="en-US" dirty="0"/>
           </a:p>
         </p:txBody>
       </p:sp>
@@ -5251,19 +6395,14 @@
         </p:nvSpPr>
         <p:spPr/>
         <p:txBody>
-          <a:bodyPr/>
+          <a:bodyPr>
+            <a:normAutofit fontScale="92500" lnSpcReduction="20000"/>
+          </a:bodyPr>
           <a:lstStyle/>
           <a:p>
             <a:r>
               <a:rPr lang="en-US" dirty="0" smtClean="0"/>
-              <a:t>Integration Server settings</a:t>
-            </a:r>
-          </a:p>
-          <a:p>
-            <a:pPr lvl="1"/>
-            <a:r>
-              <a:rPr lang="en-US" dirty="0" smtClean="0"/>
-              <a:t>SVN/</a:t>
+              <a:t>On the </a:t>
             </a:r>
             <a:r>
               <a:rPr lang="en-US" dirty="0" err="1" smtClean="0"/>
@@ -5271,58 +6410,133 @@
             </a:r>
             <a:r>
               <a:rPr lang="en-US" dirty="0" smtClean="0"/>
-              <a:t> user mapping</a:t>
-            </a:r>
+              <a:t> server:</a:t>
+            </a:r>
+            <a:endParaRPr lang="en-US" dirty="0" smtClean="0"/>
           </a:p>
           <a:p>
             <a:pPr lvl="1"/>
+            <a:r>
+              <a:rPr lang="en-US" dirty="0" smtClean="0"/>
+              <a:t>Configure </a:t>
+            </a:r>
+            <a:r>
+              <a:rPr lang="en-US" dirty="0" err="1" smtClean="0"/>
+              <a:t>plugin.properties</a:t>
+            </a:r>
+            <a:r>
+              <a:rPr lang="en-US" dirty="0" smtClean="0"/>
+              <a:t> to match your </a:t>
+            </a:r>
             <a:r>
               <a:rPr lang="en-US" dirty="0" err="1" smtClean="0"/>
               <a:t>Hansoft</a:t>
             </a:r>
             <a:r>
               <a:rPr lang="en-US" dirty="0" smtClean="0"/>
-              <a:t> SDK username/password</a:t>
-            </a:r>
+              <a:t> environment</a:t>
+            </a:r>
+            <a:endParaRPr lang="en-US" dirty="0" smtClean="0"/>
           </a:p>
           <a:p>
             <a:pPr lvl="1"/>
+            <a:r>
+              <a:rPr lang="en-US" dirty="0" smtClean="0"/>
+              <a:t>Run </a:t>
+            </a:r>
+            <a:r>
+              <a:rPr lang="en-US" dirty="0" smtClean="0"/>
+              <a:t>“</a:t>
+            </a:r>
+            <a:r>
+              <a:rPr lang="en-US" dirty="0" err="1" smtClean="0"/>
+              <a:t>HansoftSVNPusher</a:t>
+            </a:r>
+            <a:r>
+              <a:rPr lang="en-US" dirty="0" smtClean="0"/>
+              <a:t> -a” </a:t>
+            </a:r>
+            <a:r>
+              <a:rPr lang="en-US" dirty="0" smtClean="0"/>
+              <a:t>to upload the </a:t>
+            </a:r>
             <a:r>
               <a:rPr lang="en-US" dirty="0" err="1" smtClean="0"/>
               <a:t>Hansoft</a:t>
             </a:r>
             <a:r>
               <a:rPr lang="en-US" dirty="0" smtClean="0"/>
-              <a:t> Database</a:t>
+              <a:t>/SVN client plug-</a:t>
+            </a:r>
+            <a:r>
+              <a:rPr lang="en-US" dirty="0" smtClean="0"/>
+              <a:t>ins</a:t>
+            </a:r>
+          </a:p>
+          <a:p>
+            <a:r>
+              <a:rPr lang="en-US" dirty="0" smtClean="0"/>
+              <a:t>On the SVN server:</a:t>
             </a:r>
           </a:p>
           <a:p>
             <a:pPr lvl="1"/>
             <a:r>
+              <a:rPr lang="en-US" dirty="0" smtClean="0"/>
+              <a:t>Configure the post-commit hook to invoke the script ”</a:t>
+            </a:r>
+            <a:r>
               <a:rPr lang="en-US" dirty="0" err="1" smtClean="0"/>
-              <a:t>Hansoft</a:t>
+              <a:t>hansoftclient.py</a:t>
             </a:r>
             <a:r>
               <a:rPr lang="en-US" dirty="0" smtClean="0"/>
-              <a:t> SDK or library path</a:t>
+              <a:t>” – details, see TBD</a:t>
+            </a:r>
+          </a:p>
+          <a:p>
+            <a:r>
+              <a:rPr lang="en-US" dirty="0" smtClean="0"/>
+              <a:t>Deploy the ”</a:t>
+            </a:r>
+            <a:r>
+              <a:rPr lang="en-US" dirty="0" err="1" smtClean="0"/>
+              <a:t>hansoft</a:t>
+            </a:r>
+            <a:r>
+              <a:rPr lang="en-US" dirty="0" smtClean="0"/>
+              <a:t>-integration” package </a:t>
             </a:r>
           </a:p>
           <a:p>
             <a:pPr lvl="1"/>
             <a:r>
+              <a:rPr lang="en-US" dirty="0" smtClean="0"/>
+              <a:t>Configure the </a:t>
+            </a:r>
+            <a:r>
               <a:rPr lang="en-US" dirty="0" err="1" smtClean="0"/>
-              <a:t>Hansoft</a:t>
+              <a:t>server.properties</a:t>
             </a:r>
             <a:r>
               <a:rPr lang="en-US" dirty="0" smtClean="0"/>
-              <a:t> server host, port</a:t>
-            </a:r>
-          </a:p>
-          <a:p>
-            <a:endParaRPr lang="en-US" dirty="0" smtClean="0"/>
-          </a:p>
-          <a:p>
-            <a:endParaRPr lang="en-US" dirty="0"/>
+              <a:t> file</a:t>
+            </a:r>
+          </a:p>
+          <a:p>
+            <a:pPr lvl="1"/>
+            <a:r>
+              <a:rPr lang="en-US" dirty="0" smtClean="0"/>
+              <a:t>Launch using </a:t>
+            </a:r>
+            <a:r>
+              <a:rPr lang="en-US" dirty="0" err="1" smtClean="0"/>
+              <a:t>integrationserver.sh</a:t>
+            </a:r>
+            <a:r>
+              <a:rPr lang="en-US" dirty="0" smtClean="0"/>
+              <a:t>/.bat</a:t>
+            </a:r>
           </a:p>
         </p:txBody>
       </p:sp>
@@ -5374,103 +6588,108 @@
           <a:lstStyle/>
           <a:p>
             <a:r>
+              <a:rPr lang="en-US" smtClean="0"/>
+              <a:t>Configuration</a:t>
+            </a:r>
+            <a:endParaRPr lang="en-US"/>
+          </a:p>
+        </p:txBody>
+      </p:sp>
+      <p:sp>
+        <p:nvSpPr>
+          <p:cNvPr id="3" name="Platshållare för innehåll 2"/>
+          <p:cNvSpPr>
+            <a:spLocks noGrp="1"/>
+          </p:cNvSpPr>
+          <p:nvPr>
+            <p:ph idx="1"/>
+          </p:nvPr>
+        </p:nvSpPr>
+        <p:spPr/>
+        <p:txBody>
+          <a:bodyPr/>
+          <a:lstStyle/>
+          <a:p>
+            <a:r>
               <a:rPr lang="en-US" dirty="0" smtClean="0"/>
-              <a:t>Ports</a:t>
-            </a:r>
+              <a:t>Integration Server settings</a:t>
+            </a:r>
+          </a:p>
+          <a:p>
+            <a:pPr lvl="1"/>
+            <a:r>
+              <a:rPr lang="en-US" dirty="0" smtClean="0"/>
+              <a:t>SVN/</a:t>
+            </a:r>
+            <a:r>
+              <a:rPr lang="en-US" dirty="0" err="1" smtClean="0"/>
+              <a:t>Hansoft</a:t>
+            </a:r>
+            <a:r>
+              <a:rPr lang="en-US" dirty="0" smtClean="0"/>
+              <a:t> user mapping</a:t>
+            </a:r>
+          </a:p>
+          <a:p>
+            <a:pPr lvl="1"/>
+            <a:r>
+              <a:rPr lang="en-US" dirty="0" err="1" smtClean="0"/>
+              <a:t>Hansoft</a:t>
+            </a:r>
+            <a:r>
+              <a:rPr lang="en-US" dirty="0" smtClean="0"/>
+              <a:t> SDK username/password</a:t>
+            </a:r>
+          </a:p>
+          <a:p>
+            <a:pPr lvl="1"/>
+            <a:r>
+              <a:rPr lang="en-US" dirty="0" err="1" smtClean="0"/>
+              <a:t>Hansoft</a:t>
+            </a:r>
+            <a:r>
+              <a:rPr lang="en-US" dirty="0" smtClean="0"/>
+              <a:t> Database</a:t>
+            </a:r>
+          </a:p>
+          <a:p>
+            <a:pPr lvl="1"/>
+            <a:r>
+              <a:rPr lang="en-US" dirty="0" err="1" smtClean="0"/>
+              <a:t>Hansoft</a:t>
+            </a:r>
+            <a:r>
+              <a:rPr lang="en-US" dirty="0" smtClean="0"/>
+              <a:t> SDK or library path</a:t>
+            </a:r>
+          </a:p>
+          <a:p>
+            <a:pPr lvl="1"/>
+            <a:r>
+              <a:rPr lang="en-US" dirty="0" err="1" smtClean="0"/>
+              <a:t>Hansoft</a:t>
+            </a:r>
+            <a:r>
+              <a:rPr lang="en-US" dirty="0" smtClean="0"/>
+              <a:t> server host, </a:t>
+            </a:r>
+            <a:r>
+              <a:rPr lang="en-US" dirty="0" smtClean="0"/>
+              <a:t>port</a:t>
+            </a:r>
+          </a:p>
+          <a:p>
+            <a:pPr lvl="1"/>
+            <a:r>
+              <a:rPr lang="en-US" dirty="0" smtClean="0"/>
+              <a:t>List of managed SVN repositories</a:t>
+            </a:r>
+          </a:p>
+          <a:p>
+            <a:endParaRPr lang="en-US" dirty="0" smtClean="0"/>
+          </a:p>
+          <a:p>
             <a:endParaRPr lang="en-US" dirty="0"/>
-          </a:p>
-        </p:txBody>
-      </p:sp>
-      <p:sp>
-        <p:nvSpPr>
-          <p:cNvPr id="3" name="Platshållare för innehåll 2"/>
-          <p:cNvSpPr>
-            <a:spLocks noGrp="1"/>
-          </p:cNvSpPr>
-          <p:nvPr>
-            <p:ph idx="1"/>
-          </p:nvPr>
-        </p:nvSpPr>
-        <p:spPr/>
-        <p:txBody>
-          <a:bodyPr/>
-          <a:lstStyle/>
-          <a:p>
-            <a:r>
-              <a:rPr lang="en-US" dirty="0" smtClean="0"/>
-              <a:t>Integration Server listens to port 9005</a:t>
-            </a:r>
-          </a:p>
-          <a:p>
-            <a:pPr lvl="1"/>
-            <a:r>
-              <a:rPr lang="en-US" dirty="0" smtClean="0"/>
-              <a:t>Configurable in the </a:t>
-            </a:r>
-            <a:r>
-              <a:rPr lang="en-US" dirty="0" err="1" smtClean="0"/>
-              <a:t>server.properties</a:t>
-            </a:r>
-            <a:r>
-              <a:rPr lang="en-US" dirty="0" smtClean="0"/>
-              <a:t> file</a:t>
-            </a:r>
-          </a:p>
-          <a:p>
-            <a:r>
-              <a:rPr lang="en-US" dirty="0" smtClean="0"/>
-              <a:t>The SVN annotation server listens to port 9006</a:t>
-            </a:r>
-          </a:p>
-          <a:p>
-            <a:pPr lvl="1"/>
-            <a:r>
-              <a:rPr lang="en-US" dirty="0" smtClean="0"/>
-              <a:t>Configurable in</a:t>
-            </a:r>
-            <a:r>
-              <a:rPr lang="en-US" dirty="0" smtClean="0"/>
-              <a:t> </a:t>
-            </a:r>
-          </a:p>
-          <a:p>
-            <a:pPr lvl="2"/>
-            <a:r>
-              <a:rPr lang="en-US" dirty="0" smtClean="0"/>
-              <a:t>hook</a:t>
-            </a:r>
-            <a:r>
-              <a:rPr lang="en-US" dirty="0" smtClean="0"/>
-              <a:t>-</a:t>
-            </a:r>
-            <a:r>
-              <a:rPr lang="en-US" dirty="0" err="1" smtClean="0"/>
-              <a:t>config.conf</a:t>
-            </a:r>
-            <a:r>
-              <a:rPr lang="en-US" dirty="0" smtClean="0"/>
-              <a:t> </a:t>
-            </a:r>
-            <a:r>
-              <a:rPr lang="en-US" dirty="0" smtClean="0"/>
-              <a:t>file </a:t>
-            </a:r>
-            <a:r>
-              <a:rPr lang="en-US" dirty="0" smtClean="0"/>
-              <a:t>– for the SVN post-commit hook</a:t>
-            </a:r>
-          </a:p>
-          <a:p>
-            <a:pPr lvl="2"/>
-            <a:r>
-              <a:rPr lang="en-US" dirty="0" err="1" smtClean="0"/>
-              <a:t>server.properties</a:t>
-            </a:r>
-            <a:r>
-              <a:rPr lang="en-US" dirty="0" smtClean="0"/>
-              <a:t> – for the Integration Server</a:t>
-            </a:r>
-            <a:endParaRPr lang="en-US" dirty="0" smtClean="0"/>
           </a:p>
         </p:txBody>
       </p:sp>
@@ -5479,6 +6698,13 @@
   <p:clrMapOvr>
     <a:masterClrMapping/>
   </p:clrMapOvr>
+  <p:timing>
+    <p:tnLst>
+      <p:par>
+        <p:cTn id="1" dur="indefinite" restart="never" nodeType="tmRoot"/>
+      </p:par>
+    </p:tnLst>
+  </p:timing>
 </p:sld>
 </file>
 
@@ -5511,128 +6737,106 @@
         </p:nvSpPr>
         <p:spPr/>
         <p:txBody>
-          <a:bodyPr>
-            <a:normAutofit fontScale="90000"/>
-          </a:bodyPr>
+          <a:bodyPr/>
           <a:lstStyle/>
           <a:p>
             <a:r>
               <a:rPr lang="en-US" dirty="0" smtClean="0"/>
-              <a:t>Launching</a:t>
-            </a:r>
-            <a:br>
+              <a:t>Ports</a:t>
+            </a:r>
+            <a:endParaRPr lang="en-US" dirty="0"/>
+          </a:p>
+        </p:txBody>
+      </p:sp>
+      <p:sp>
+        <p:nvSpPr>
+          <p:cNvPr id="3" name="Platshållare för innehåll 2"/>
+          <p:cNvSpPr>
+            <a:spLocks noGrp="1"/>
+          </p:cNvSpPr>
+          <p:nvPr>
+            <p:ph idx="1"/>
+          </p:nvPr>
+        </p:nvSpPr>
+        <p:spPr/>
+        <p:txBody>
+          <a:bodyPr/>
+          <a:lstStyle/>
+          <a:p>
+            <a:r>
               <a:rPr lang="en-US" dirty="0" smtClean="0"/>
-            </a:br>
-            <a:endParaRPr lang="en-US" dirty="0"/>
-          </a:p>
-        </p:txBody>
-      </p:sp>
-      <p:sp>
-        <p:nvSpPr>
-          <p:cNvPr id="3" name="Platshållare för innehåll 2"/>
-          <p:cNvSpPr>
-            <a:spLocks noGrp="1"/>
-          </p:cNvSpPr>
-          <p:nvPr>
-            <p:ph idx="1"/>
-          </p:nvPr>
-        </p:nvSpPr>
-        <p:spPr/>
-        <p:txBody>
-          <a:bodyPr/>
-          <a:lstStyle/>
-          <a:p>
-            <a:pPr marL="514350" indent="-514350">
-              <a:buFont typeface="+mj-lt"/>
-              <a:buAutoNum type="arabicPeriod"/>
-            </a:pPr>
+              <a:t>Integration Server listens to port 9005</a:t>
+            </a:r>
+          </a:p>
+          <a:p>
+            <a:pPr lvl="1"/>
             <a:r>
               <a:rPr lang="en-US" dirty="0" smtClean="0"/>
-              <a:t>Start the integration server with the launch script:</a:t>
+              <a:t>Configurable in the </a:t>
+            </a:r>
+            <a:r>
+              <a:rPr lang="en-US" dirty="0" err="1" smtClean="0"/>
+              <a:t>server.properties</a:t>
+            </a:r>
+            <a:r>
+              <a:rPr lang="en-US" dirty="0" smtClean="0"/>
+              <a:t> file</a:t>
+            </a:r>
+          </a:p>
+          <a:p>
+            <a:r>
+              <a:rPr lang="en-US" dirty="0" smtClean="0"/>
+              <a:t>The SVN annotation server listens to port 9006</a:t>
             </a:r>
           </a:p>
           <a:p>
             <a:pPr lvl="1"/>
             <a:r>
               <a:rPr lang="en-US" dirty="0" smtClean="0"/>
-              <a:t>Linux/OSX:  </a:t>
-            </a:r>
-            <a:r>
-              <a:rPr lang="en-US" dirty="0" err="1" smtClean="0">
-                <a:latin typeface="Courier New"/>
-                <a:cs typeface="Courier New"/>
-              </a:rPr>
-              <a:t>integrationserver.sh</a:t>
-            </a:r>
-            <a:endParaRPr lang="en-US" dirty="0" smtClean="0">
-              <a:latin typeface="Courier New"/>
-              <a:cs typeface="Courier New"/>
-            </a:endParaRPr>
-          </a:p>
-          <a:p>
-            <a:pPr lvl="1"/>
+              <a:t>Configurable in </a:t>
+            </a:r>
+          </a:p>
+          <a:p>
+            <a:pPr lvl="2"/>
             <a:r>
               <a:rPr lang="en-US" dirty="0" smtClean="0"/>
-              <a:t>Windows:  </a:t>
-            </a:r>
-            <a:r>
-              <a:rPr lang="en-US" dirty="0" err="1" smtClean="0">
-                <a:latin typeface="Courier New"/>
-                <a:cs typeface="Courier New"/>
-              </a:rPr>
-              <a:t>integrationserver.bat</a:t>
-            </a:r>
-            <a:endParaRPr lang="en-US" dirty="0" smtClean="0">
-              <a:latin typeface="Courier New"/>
-              <a:cs typeface="Courier New"/>
-            </a:endParaRPr>
-          </a:p>
-          <a:p>
-            <a:pPr marL="514350" indent="-514350">
-              <a:buFont typeface="+mj-lt"/>
-              <a:buAutoNum type="arabicPeriod"/>
-            </a:pPr>
+              <a:t>hook-</a:t>
+            </a:r>
+            <a:r>
+              <a:rPr lang="en-US" dirty="0" err="1" smtClean="0"/>
+              <a:t>config.conf</a:t>
+            </a:r>
             <a:r>
               <a:rPr lang="en-US" dirty="0" smtClean="0"/>
-              <a:t>Start the SVN annotation server:</a:t>
-            </a:r>
-          </a:p>
-          <a:p>
-            <a:pPr lvl="1"/>
+              <a:t> file – for the SVN post-commit hook</a:t>
+            </a:r>
+          </a:p>
+          <a:p>
+            <a:pPr lvl="2"/>
+            <a:r>
+              <a:rPr lang="en-US" dirty="0" err="1" smtClean="0"/>
+              <a:t>server.properties</a:t>
+            </a:r>
             <a:r>
               <a:rPr lang="en-US" dirty="0" smtClean="0"/>
-              <a:t>Linux/OSX:  </a:t>
-            </a:r>
-            <a:r>
-              <a:rPr lang="en-US" dirty="0" err="1" smtClean="0">
-                <a:latin typeface="Courier New"/>
-                <a:cs typeface="Courier New"/>
-              </a:rPr>
-              <a:t>run_hansoftserver.sh</a:t>
-            </a:r>
-            <a:endParaRPr lang="en-US" dirty="0" smtClean="0">
-              <a:latin typeface="Courier New"/>
-              <a:cs typeface="Courier New"/>
-            </a:endParaRPr>
-          </a:p>
-          <a:p>
-            <a:pPr lvl="1"/>
+              <a:t> – for the Integration </a:t>
+            </a:r>
             <a:r>
               <a:rPr lang="en-US" dirty="0" smtClean="0"/>
-              <a:t>Windows:  </a:t>
-            </a:r>
-            <a:r>
-              <a:rPr lang="en-US" dirty="0" err="1" smtClean="0">
-                <a:latin typeface="Courier New"/>
-                <a:cs typeface="Courier New"/>
-              </a:rPr>
-              <a:t>run_hansoftserver.bat</a:t>
+              <a:t>Server</a:t>
+            </a:r>
+          </a:p>
+          <a:p>
+            <a:pPr lvl="2"/>
+            <a:r>
+              <a:rPr lang="en-US" dirty="0" err="1" smtClean="0"/>
+              <a:t>server.conf</a:t>
+            </a:r>
+            <a:r>
+              <a:rPr lang="en-US" dirty="0" smtClean="0"/>
+              <a:t> – for the SVN annotation server</a:t>
             </a:r>
             <a:endParaRPr lang="en-US" dirty="0" smtClean="0"/>
-          </a:p>
-          <a:p>
-            <a:pPr lvl="1"/>
-            <a:endParaRPr lang="en-US" dirty="0"/>
           </a:p>
         </p:txBody>
       </p:sp>
@@ -5673,6 +6877,168 @@
         </p:nvSpPr>
         <p:spPr/>
         <p:txBody>
+          <a:bodyPr>
+            <a:normAutofit fontScale="90000"/>
+          </a:bodyPr>
+          <a:lstStyle/>
+          <a:p>
+            <a:r>
+              <a:rPr lang="en-US" dirty="0" smtClean="0"/>
+              <a:t>Launching</a:t>
+            </a:r>
+            <a:br>
+              <a:rPr lang="en-US" dirty="0" smtClean="0"/>
+            </a:br>
+            <a:endParaRPr lang="en-US" dirty="0"/>
+          </a:p>
+        </p:txBody>
+      </p:sp>
+      <p:sp>
+        <p:nvSpPr>
+          <p:cNvPr id="3" name="Platshållare för innehåll 2"/>
+          <p:cNvSpPr>
+            <a:spLocks noGrp="1"/>
+          </p:cNvSpPr>
+          <p:nvPr>
+            <p:ph idx="1"/>
+          </p:nvPr>
+        </p:nvSpPr>
+        <p:spPr/>
+        <p:txBody>
+          <a:bodyPr/>
+          <a:lstStyle/>
+          <a:p>
+            <a:pPr marL="514350" indent="-514350">
+              <a:buFont typeface="+mj-lt"/>
+              <a:buAutoNum type="arabicPeriod"/>
+            </a:pPr>
+            <a:r>
+              <a:rPr lang="en-US" dirty="0" smtClean="0"/>
+              <a:t>Start the integration server with the launch script:</a:t>
+            </a:r>
+          </a:p>
+          <a:p>
+            <a:pPr lvl="1"/>
+            <a:r>
+              <a:rPr lang="en-US" dirty="0" smtClean="0"/>
+              <a:t>Linux/OSX:  </a:t>
+            </a:r>
+            <a:r>
+              <a:rPr lang="en-US" dirty="0" err="1" smtClean="0">
+                <a:latin typeface="Courier New"/>
+                <a:cs typeface="Courier New"/>
+              </a:rPr>
+              <a:t>integrationserver.sh</a:t>
+            </a:r>
+            <a:endParaRPr lang="en-US" dirty="0" smtClean="0">
+              <a:latin typeface="Courier New"/>
+              <a:cs typeface="Courier New"/>
+            </a:endParaRPr>
+          </a:p>
+          <a:p>
+            <a:pPr lvl="1"/>
+            <a:r>
+              <a:rPr lang="en-US" dirty="0" smtClean="0"/>
+              <a:t>Windows:  </a:t>
+            </a:r>
+            <a:r>
+              <a:rPr lang="en-US" dirty="0" err="1" smtClean="0">
+                <a:latin typeface="Courier New"/>
+                <a:cs typeface="Courier New"/>
+              </a:rPr>
+              <a:t>integrationserver.bat</a:t>
+            </a:r>
+            <a:endParaRPr lang="en-US" dirty="0" smtClean="0">
+              <a:latin typeface="Courier New"/>
+              <a:cs typeface="Courier New"/>
+            </a:endParaRPr>
+          </a:p>
+          <a:p>
+            <a:pPr marL="514350" indent="-514350">
+              <a:buFont typeface="+mj-lt"/>
+              <a:buAutoNum type="arabicPeriod"/>
+            </a:pPr>
+            <a:r>
+              <a:rPr lang="en-US" dirty="0" smtClean="0"/>
+              <a:t>Start the SVN annotation server:</a:t>
+            </a:r>
+          </a:p>
+          <a:p>
+            <a:pPr lvl="1"/>
+            <a:r>
+              <a:rPr lang="en-US" dirty="0" smtClean="0"/>
+              <a:t>Linux/OSX:  </a:t>
+            </a:r>
+            <a:r>
+              <a:rPr lang="en-US" dirty="0" err="1" smtClean="0">
+                <a:latin typeface="Courier New"/>
+                <a:cs typeface="Courier New"/>
+              </a:rPr>
+              <a:t>run_hansoftserver.sh</a:t>
+            </a:r>
+            <a:endParaRPr lang="en-US" dirty="0" smtClean="0">
+              <a:latin typeface="Courier New"/>
+              <a:cs typeface="Courier New"/>
+            </a:endParaRPr>
+          </a:p>
+          <a:p>
+            <a:pPr lvl="1"/>
+            <a:r>
+              <a:rPr lang="en-US" dirty="0" smtClean="0"/>
+              <a:t>Windows:  </a:t>
+            </a:r>
+            <a:r>
+              <a:rPr lang="en-US" dirty="0" err="1" smtClean="0">
+                <a:latin typeface="Courier New"/>
+                <a:cs typeface="Courier New"/>
+              </a:rPr>
+              <a:t>run_hansoftserver.bat</a:t>
+            </a:r>
+            <a:endParaRPr lang="en-US" dirty="0" smtClean="0"/>
+          </a:p>
+          <a:p>
+            <a:pPr lvl="1"/>
+            <a:endParaRPr lang="en-US" dirty="0"/>
+          </a:p>
+        </p:txBody>
+      </p:sp>
+    </p:spTree>
+  </p:cSld>
+  <p:clrMapOvr>
+    <a:masterClrMapping/>
+  </p:clrMapOvr>
+</p:sld>
+</file>
+
+<file path=ppt/slides/slide9.xml><?xml version="1.0" encoding="utf-8"?>
+<p:sld xmlns:a="http://schemas.openxmlformats.org/drawingml/2006/main" xmlns:r="http://schemas.openxmlformats.org/officeDocument/2006/relationships" xmlns:mc="http://schemas.openxmlformats.org/markup-compatibility/2006" xmlns:mv="urn:schemas-microsoft-com:mac:vml" xmlns:p="http://schemas.openxmlformats.org/presentationml/2006/main" mc:Ignorable="mv" mc:PreserveAttributes="mv:*">
+  <p:cSld>
+    <p:spTree>
+      <p:nvGrpSpPr>
+        <p:cNvPr id="1" name=""/>
+        <p:cNvGrpSpPr/>
+        <p:nvPr/>
+      </p:nvGrpSpPr>
+      <p:grpSpPr>
+        <a:xfrm>
+          <a:off x="0" y="0"/>
+          <a:ext cx="0" cy="0"/>
+          <a:chOff x="0" y="0"/>
+          <a:chExt cx="0" cy="0"/>
+        </a:xfrm>
+      </p:grpSpPr>
+      <p:sp>
+        <p:nvSpPr>
+          <p:cNvPr id="2" name="Rubrik 1"/>
+          <p:cNvSpPr>
+            <a:spLocks noGrp="1"/>
+          </p:cNvSpPr>
+          <p:nvPr>
+            <p:ph type="title"/>
+          </p:nvPr>
+        </p:nvSpPr>
+        <p:spPr/>
+        <p:txBody>
           <a:bodyPr/>
           <a:lstStyle/>
           <a:p>
@@ -5704,8 +7070,13 @@
             </a:pPr>
             <a:r>
               <a:rPr lang="en-US" dirty="0" smtClean="0"/>
-              <a:t>Limitations as of 2014-09-03:</a:t>
-            </a:r>
+              <a:t>Limitations as of 2014</a:t>
+            </a:r>
+            <a:r>
+              <a:rPr lang="en-US" dirty="0" smtClean="0"/>
+              <a:t>-10-27:</a:t>
+            </a:r>
+            <a:endParaRPr lang="en-US" dirty="0" smtClean="0"/>
           </a:p>
           <a:p>
             <a:r>
@@ -5718,19 +7089,12 @@
             </a:r>
             <a:r>
               <a:rPr lang="en-US" dirty="0" smtClean="0"/>
-              <a:t> items to previous commits not yet implemented</a:t>
-            </a:r>
-          </a:p>
-          <a:p>
-            <a:r>
-              <a:rPr lang="en-US" smtClean="0"/>
-              <a:t>Client plug-in </a:t>
+              <a:t> items to previous commits not yet </a:t>
             </a:r>
             <a:r>
               <a:rPr lang="en-US" dirty="0" smtClean="0"/>
-              <a:t>not yet available for Windows</a:t>
-            </a:r>
-            <a:endParaRPr lang="en-US" dirty="0"/>
+              <a:t>implemented – implemented shortly ;-)</a:t>
+            </a:r>
           </a:p>
         </p:txBody>
       </p:sp>

</xml_diff>

<commit_message>
Updates the HansoftSVN Integration Overview presentation with configuration details
</commit_message>
<xml_diff>
--- a/HansoftSVN Integration Overview.pptx
+++ b/HansoftSVN Integration Overview.pptx
@@ -11,9 +11,10 @@
     <p:sldId id="264" r:id="rId5"/>
     <p:sldId id="262" r:id="rId6"/>
     <p:sldId id="258" r:id="rId7"/>
-    <p:sldId id="263" r:id="rId8"/>
-    <p:sldId id="259" r:id="rId9"/>
-    <p:sldId id="260" r:id="rId10"/>
+    <p:sldId id="265" r:id="rId8"/>
+    <p:sldId id="263" r:id="rId9"/>
+    <p:sldId id="259" r:id="rId10"/>
+    <p:sldId id="260" r:id="rId11"/>
   </p:sldIdLst>
   <p:sldSz cx="9144000" cy="6858000" type="screen4x3"/>
   <p:notesSz cx="6858000" cy="9144000"/>
@@ -297,7 +298,7 @@
             <a:fld id="{A85315BB-618E-E34C-99D4-26B490314AB3}" type="datetimeFigureOut">
               <a:rPr lang="sv-SE" smtClean="0"/>
               <a:pPr/>
-              <a:t>14-10-27</a:t>
+              <a:t>14-12-04</a:t>
             </a:fld>
             <a:endParaRPr lang="en-US"/>
           </a:p>
@@ -464,7 +465,7 @@
             <a:fld id="{A85315BB-618E-E34C-99D4-26B490314AB3}" type="datetimeFigureOut">
               <a:rPr lang="sv-SE" smtClean="0"/>
               <a:pPr/>
-              <a:t>14-10-27</a:t>
+              <a:t>14-12-04</a:t>
             </a:fld>
             <a:endParaRPr lang="en-US"/>
           </a:p>
@@ -641,7 +642,7 @@
             <a:fld id="{A85315BB-618E-E34C-99D4-26B490314AB3}" type="datetimeFigureOut">
               <a:rPr lang="sv-SE" smtClean="0"/>
               <a:pPr/>
-              <a:t>14-10-27</a:t>
+              <a:t>14-12-04</a:t>
             </a:fld>
             <a:endParaRPr lang="en-US"/>
           </a:p>
@@ -808,7 +809,7 @@
             <a:fld id="{A85315BB-618E-E34C-99D4-26B490314AB3}" type="datetimeFigureOut">
               <a:rPr lang="sv-SE" smtClean="0"/>
               <a:pPr/>
-              <a:t>14-10-27</a:t>
+              <a:t>14-12-04</a:t>
             </a:fld>
             <a:endParaRPr lang="en-US"/>
           </a:p>
@@ -1051,7 +1052,7 @@
             <a:fld id="{A85315BB-618E-E34C-99D4-26B490314AB3}" type="datetimeFigureOut">
               <a:rPr lang="sv-SE" smtClean="0"/>
               <a:pPr/>
-              <a:t>14-10-27</a:t>
+              <a:t>14-12-04</a:t>
             </a:fld>
             <a:endParaRPr lang="en-US"/>
           </a:p>
@@ -1336,7 +1337,7 @@
             <a:fld id="{A85315BB-618E-E34C-99D4-26B490314AB3}" type="datetimeFigureOut">
               <a:rPr lang="sv-SE" smtClean="0"/>
               <a:pPr/>
-              <a:t>14-10-27</a:t>
+              <a:t>14-12-04</a:t>
             </a:fld>
             <a:endParaRPr lang="en-US"/>
           </a:p>
@@ -1755,7 +1756,7 @@
             <a:fld id="{A85315BB-618E-E34C-99D4-26B490314AB3}" type="datetimeFigureOut">
               <a:rPr lang="sv-SE" smtClean="0"/>
               <a:pPr/>
-              <a:t>14-10-27</a:t>
+              <a:t>14-12-04</a:t>
             </a:fld>
             <a:endParaRPr lang="en-US"/>
           </a:p>
@@ -1870,7 +1871,7 @@
             <a:fld id="{A85315BB-618E-E34C-99D4-26B490314AB3}" type="datetimeFigureOut">
               <a:rPr lang="sv-SE" smtClean="0"/>
               <a:pPr/>
-              <a:t>14-10-27</a:t>
+              <a:t>14-12-04</a:t>
             </a:fld>
             <a:endParaRPr lang="en-US"/>
           </a:p>
@@ -1962,7 +1963,7 @@
             <a:fld id="{A85315BB-618E-E34C-99D4-26B490314AB3}" type="datetimeFigureOut">
               <a:rPr lang="sv-SE" smtClean="0"/>
               <a:pPr/>
-              <a:t>14-10-27</a:t>
+              <a:t>14-12-04</a:t>
             </a:fld>
             <a:endParaRPr lang="en-US"/>
           </a:p>
@@ -2236,7 +2237,7 @@
             <a:fld id="{A85315BB-618E-E34C-99D4-26B490314AB3}" type="datetimeFigureOut">
               <a:rPr lang="sv-SE" smtClean="0"/>
               <a:pPr/>
-              <a:t>14-10-27</a:t>
+              <a:t>14-12-04</a:t>
             </a:fld>
             <a:endParaRPr lang="en-US"/>
           </a:p>
@@ -2486,7 +2487,7 @@
             <a:fld id="{A85315BB-618E-E34C-99D4-26B490314AB3}" type="datetimeFigureOut">
               <a:rPr lang="sv-SE" smtClean="0"/>
               <a:pPr/>
-              <a:t>14-10-27</a:t>
+              <a:t>14-12-04</a:t>
             </a:fld>
             <a:endParaRPr lang="en-US"/>
           </a:p>
@@ -2696,7 +2697,7 @@
             <a:fld id="{A85315BB-618E-E34C-99D4-26B490314AB3}" type="datetimeFigureOut">
               <a:rPr lang="sv-SE" smtClean="0"/>
               <a:pPr/>
-              <a:t>14-10-27</a:t>
+              <a:t>14-12-04</a:t>
             </a:fld>
             <a:endParaRPr lang="en-US"/>
           </a:p>
@@ -3113,11 +3114,12 @@
               <a:rPr lang="en-US" i="1" dirty="0" smtClean="0"/>
               <a:t>Draft</a:t>
             </a:r>
-          </a:p>
-          <a:p>
-            <a:r>
-              <a:rPr lang="en-US" dirty="0" smtClean="0"/>
-              <a:t>2014-09-03</a:t>
+            <a:endParaRPr lang="en-US" i="1" dirty="0" smtClean="0"/>
+          </a:p>
+          <a:p>
+            <a:r>
+              <a:rPr lang="en-US" smtClean="0"/>
+              <a:t>2015-01-05</a:t>
             </a:r>
             <a:endParaRPr lang="en-US" dirty="0"/>
           </a:p>
@@ -3135,6 +3137,92 @@
       </p:par>
     </p:tnLst>
   </p:timing>
+</p:sld>
+</file>
+
+<file path=ppt/slides/slide10.xml><?xml version="1.0" encoding="utf-8"?>
+<p:sld xmlns:a="http://schemas.openxmlformats.org/drawingml/2006/main" xmlns:r="http://schemas.openxmlformats.org/officeDocument/2006/relationships" xmlns:mc="http://schemas.openxmlformats.org/markup-compatibility/2006" xmlns:mv="urn:schemas-microsoft-com:mac:vml" xmlns:p="http://schemas.openxmlformats.org/presentationml/2006/main" mc:Ignorable="mv" mc:PreserveAttributes="mv:*">
+  <p:cSld>
+    <p:spTree>
+      <p:nvGrpSpPr>
+        <p:cNvPr id="1" name=""/>
+        <p:cNvGrpSpPr/>
+        <p:nvPr/>
+      </p:nvGrpSpPr>
+      <p:grpSpPr>
+        <a:xfrm>
+          <a:off x="0" y="0"/>
+          <a:ext cx="0" cy="0"/>
+          <a:chOff x="0" y="0"/>
+          <a:chExt cx="0" cy="0"/>
+        </a:xfrm>
+      </p:grpSpPr>
+      <p:sp>
+        <p:nvSpPr>
+          <p:cNvPr id="2" name="Rubrik 1"/>
+          <p:cNvSpPr>
+            <a:spLocks noGrp="1"/>
+          </p:cNvSpPr>
+          <p:nvPr>
+            <p:ph type="title"/>
+          </p:nvPr>
+        </p:nvSpPr>
+        <p:spPr/>
+        <p:txBody>
+          <a:bodyPr/>
+          <a:lstStyle/>
+          <a:p>
+            <a:r>
+              <a:rPr lang="en-US" dirty="0" smtClean="0"/>
+              <a:t>Limitations</a:t>
+            </a:r>
+            <a:endParaRPr lang="en-US" dirty="0"/>
+          </a:p>
+        </p:txBody>
+      </p:sp>
+      <p:sp>
+        <p:nvSpPr>
+          <p:cNvPr id="3" name="Platshållare för innehåll 2"/>
+          <p:cNvSpPr>
+            <a:spLocks noGrp="1"/>
+          </p:cNvSpPr>
+          <p:nvPr>
+            <p:ph idx="1"/>
+          </p:nvPr>
+        </p:nvSpPr>
+        <p:spPr/>
+        <p:txBody>
+          <a:bodyPr/>
+          <a:lstStyle/>
+          <a:p>
+            <a:pPr>
+              <a:buNone/>
+            </a:pPr>
+            <a:r>
+              <a:rPr lang="en-US" dirty="0" smtClean="0"/>
+              <a:t>Limitations as of 2014</a:t>
+            </a:r>
+            <a:r>
+              <a:rPr lang="en-US" dirty="0" smtClean="0"/>
+              <a:t>-12-04:</a:t>
+            </a:r>
+          </a:p>
+          <a:p>
+            <a:r>
+              <a:rPr lang="en-US" dirty="0" smtClean="0"/>
+              <a:t>-</a:t>
+            </a:r>
+          </a:p>
+          <a:p>
+            <a:endParaRPr lang="en-US" dirty="0" smtClean="0"/>
+          </a:p>
+        </p:txBody>
+      </p:sp>
+    </p:spTree>
+  </p:cSld>
+  <p:clrMapOvr>
+    <a:masterClrMapping/>
+  </p:clrMapOvr>
 </p:sld>
 </file>
 
@@ -5312,11 +5400,7 @@
           <a:p>
             <a:r>
               <a:rPr lang="en-US" dirty="0" smtClean="0"/>
-              <a:t>Sequence</a:t>
-            </a:r>
-            <a:r>
-              <a:rPr lang="en-US" dirty="0" smtClean="0"/>
-              <a:t> associating with commit</a:t>
+              <a:t>Sequence associating with commit</a:t>
             </a:r>
             <a:endParaRPr lang="en-US" dirty="0"/>
           </a:p>
@@ -5972,19 +6056,7 @@
                 <a:rPr lang="en-US" sz="1400" dirty="0" smtClean="0">
                   <a:latin typeface="Arial"/>
                 </a:rPr>
-                <a:t>3: </a:t>
-              </a:r>
-              <a:r>
-                <a:rPr lang="en-US" sz="1400" dirty="0" smtClean="0">
-                  <a:latin typeface="Arial"/>
-                </a:rPr>
-                <a:t>request list of SVN commits</a:t>
-              </a:r>
-              <a:r>
-                <a:rPr lang="en-US" sz="1400" dirty="0" smtClean="0">
-                  <a:latin typeface="Arial"/>
-                </a:rPr>
-                <a:t> </a:t>
+                <a:t>3: request list of SVN commits </a:t>
               </a:r>
             </a:p>
             <a:p>
@@ -5992,31 +6064,7 @@
                 <a:rPr lang="en-US" sz="1400" dirty="0" smtClean="0">
                   <a:latin typeface="Arial"/>
                 </a:rPr>
-                <a:t>7</a:t>
-              </a:r>
-              <a:r>
-                <a:rPr lang="en-US" sz="1400" dirty="0" smtClean="0">
-                  <a:latin typeface="Arial"/>
-                </a:rPr>
-                <a:t>: </a:t>
-              </a:r>
-              <a:r>
-                <a:rPr lang="en-US" sz="1400" dirty="0" smtClean="0">
-                  <a:latin typeface="Arial"/>
-                </a:rPr>
-                <a:t>respond </a:t>
-              </a:r>
-              <a:r>
-                <a:rPr lang="en-US" sz="1400" dirty="0" smtClean="0">
-                  <a:latin typeface="Arial"/>
-                </a:rPr>
-                <a:t>with </a:t>
-              </a:r>
-              <a:r>
-                <a:rPr lang="en-US" sz="1400" dirty="0" smtClean="0">
-                  <a:latin typeface="Arial"/>
-                </a:rPr>
-                <a:t>selection (item, commit)</a:t>
+                <a:t>7: respond with selection (item, commit)</a:t>
               </a:r>
               <a:endParaRPr lang="en-US" sz="1400" dirty="0">
                 <a:latin typeface="Arial"/>
@@ -6103,25 +6151,7 @@
                 <a:rPr lang="en-US" sz="1400" dirty="0" smtClean="0">
                   <a:latin typeface="Arial"/>
                 </a:rPr>
-                <a:t>9</a:t>
-              </a:r>
-              <a:r>
-                <a:rPr lang="en-US" sz="1400" dirty="0" smtClean="0">
-                  <a:latin typeface="Arial"/>
-                </a:rPr>
-                <a:t>: </a:t>
-              </a:r>
-              <a:r>
-                <a:rPr lang="en-US" sz="1400" dirty="0" smtClean="0">
-                  <a:latin typeface="Arial"/>
-                </a:rPr>
-                <a:t>annotate </a:t>
-              </a:r>
-              <a:r>
-                <a:rPr lang="en-US" sz="1400" dirty="0" smtClean="0">
-                  <a:latin typeface="Arial"/>
-                </a:rPr>
-                <a:t>item</a:t>
+                <a:t>9: annotate item</a:t>
               </a:r>
               <a:endParaRPr lang="en-US" sz="1400" dirty="0">
                 <a:latin typeface="Arial"/>
@@ -6212,19 +6242,7 @@
                 <a:rPr lang="en-US" sz="1400" dirty="0" smtClean="0">
                   <a:latin typeface="Arial"/>
                 </a:rPr>
-                <a:t>8</a:t>
-              </a:r>
-              <a:r>
-                <a:rPr lang="en-US" sz="1400" dirty="0" smtClean="0">
-                  <a:latin typeface="Arial"/>
-                </a:rPr>
-                <a:t>: </a:t>
-              </a:r>
-              <a:r>
-                <a:rPr lang="en-US" sz="1400" dirty="0" smtClean="0">
-                  <a:latin typeface="Arial"/>
-                </a:rPr>
-                <a:t>annotate commit</a:t>
+                <a:t>8: annotate commit</a:t>
               </a:r>
               <a:endParaRPr lang="en-US" sz="1400" dirty="0">
                 <a:latin typeface="Arial"/>
@@ -6305,19 +6323,7 @@
               <a:rPr lang="en-US" sz="1400" dirty="0" smtClean="0">
                 <a:latin typeface="Arial"/>
               </a:rPr>
-              <a:t>7</a:t>
-            </a:r>
-            <a:r>
-              <a:rPr lang="en-US" sz="1400" dirty="0" smtClean="0">
-                <a:latin typeface="Arial"/>
-              </a:rPr>
-              <a:t>: </a:t>
-            </a:r>
-            <a:r>
-              <a:rPr lang="en-US" sz="1400" dirty="0" smtClean="0">
-                <a:latin typeface="Arial"/>
-              </a:rPr>
-              <a:t>annotate commit</a:t>
+              <a:t>7: annotate commit</a:t>
             </a:r>
             <a:endParaRPr lang="en-US" sz="1400" dirty="0">
               <a:latin typeface="Arial"/>
@@ -6412,7 +6418,6 @@
               <a:rPr lang="en-US" dirty="0" smtClean="0"/>
               <a:t> server:</a:t>
             </a:r>
-            <a:endParaRPr lang="en-US" dirty="0" smtClean="0"/>
           </a:p>
           <a:p>
             <a:pPr lvl="1"/>
@@ -6436,17 +6441,12 @@
               <a:rPr lang="en-US" dirty="0" smtClean="0"/>
               <a:t> environment</a:t>
             </a:r>
-            <a:endParaRPr lang="en-US" dirty="0" smtClean="0"/>
           </a:p>
           <a:p>
             <a:pPr lvl="1"/>
             <a:r>
               <a:rPr lang="en-US" dirty="0" smtClean="0"/>
-              <a:t>Run </a:t>
-            </a:r>
-            <a:r>
-              <a:rPr lang="en-US" dirty="0" smtClean="0"/>
-              <a:t>“</a:t>
+              <a:t>Run “</a:t>
             </a:r>
             <a:r>
               <a:rPr lang="en-US" dirty="0" err="1" smtClean="0"/>
@@ -6454,11 +6454,7 @@
             </a:r>
             <a:r>
               <a:rPr lang="en-US" dirty="0" smtClean="0"/>
-              <a:t> -a” </a:t>
-            </a:r>
-            <a:r>
-              <a:rPr lang="en-US" dirty="0" smtClean="0"/>
-              <a:t>to upload the </a:t>
+              <a:t> -a” to upload the </a:t>
             </a:r>
             <a:r>
               <a:rPr lang="en-US" dirty="0" err="1" smtClean="0"/>
@@ -6466,11 +6462,7 @@
             </a:r>
             <a:r>
               <a:rPr lang="en-US" dirty="0" smtClean="0"/>
-              <a:t>/SVN client plug-</a:t>
-            </a:r>
-            <a:r>
-              <a:rPr lang="en-US" dirty="0" smtClean="0"/>
-              <a:t>ins</a:t>
+              <a:t>/SVN client plug-ins</a:t>
             </a:r>
           </a:p>
           <a:p>
@@ -6588,10 +6580,10 @@
           <a:lstStyle/>
           <a:p>
             <a:r>
-              <a:rPr lang="en-US" smtClean="0"/>
+              <a:rPr lang="en-US" dirty="0" smtClean="0"/>
               <a:t>Configuration</a:t>
             </a:r>
-            <a:endParaRPr lang="en-US"/>
+            <a:endParaRPr lang="en-US" dirty="0"/>
           </a:p>
         </p:txBody>
       </p:sp>
@@ -6607,83 +6599,151 @@
         </p:nvSpPr>
         <p:spPr/>
         <p:txBody>
-          <a:bodyPr/>
-          <a:lstStyle/>
-          <a:p>
-            <a:r>
-              <a:rPr lang="en-US" dirty="0" smtClean="0"/>
-              <a:t>Integration Server settings</a:t>
-            </a:r>
-          </a:p>
-          <a:p>
-            <a:pPr lvl="1"/>
-            <a:r>
-              <a:rPr lang="en-US" dirty="0" smtClean="0"/>
-              <a:t>SVN/</a:t>
-            </a:r>
+          <a:bodyPr>
+            <a:normAutofit fontScale="92500" lnSpcReduction="10000"/>
+          </a:bodyPr>
+          <a:lstStyle/>
+          <a:p>
             <a:r>
               <a:rPr lang="en-US" dirty="0" err="1" smtClean="0"/>
               <a:t>Hansoft</a:t>
             </a:r>
             <a:r>
               <a:rPr lang="en-US" dirty="0" smtClean="0"/>
-              <a:t> user mapping</a:t>
+              <a:t> Server</a:t>
             </a:r>
           </a:p>
           <a:p>
             <a:pPr lvl="1"/>
             <a:r>
+              <a:rPr lang="en-US" dirty="0" smtClean="0"/>
+              <a:t>Create two (2) SDK users</a:t>
+            </a:r>
+          </a:p>
+          <a:p>
+            <a:pPr lvl="2"/>
+            <a:r>
+              <a:rPr lang="en-US" dirty="0" smtClean="0"/>
+              <a:t>One to be used by the Integration server (</a:t>
+            </a:r>
+            <a:r>
               <a:rPr lang="en-US" dirty="0" err="1" smtClean="0"/>
-              <a:t>Hansoft</a:t>
-            </a:r>
-            <a:r>
-              <a:rPr lang="en-US" dirty="0" smtClean="0"/>
-              <a:t> SDK username/password</a:t>
+              <a:t>eg</a:t>
+            </a:r>
+            <a:r>
+              <a:rPr lang="en-US" dirty="0" smtClean="0"/>
+              <a:t>: SDK)</a:t>
+            </a:r>
+          </a:p>
+          <a:p>
+            <a:pPr lvl="2"/>
+            <a:r>
+              <a:rPr lang="en-US" dirty="0" smtClean="0"/>
+              <a:t>One to be used to </a:t>
+            </a:r>
+            <a:r>
+              <a:rPr lang="en-US" dirty="0" smtClean="0"/>
+              <a:t>manage the </a:t>
+            </a:r>
+            <a:r>
+              <a:rPr lang="en-US" dirty="0" err="1" smtClean="0"/>
+              <a:t>plugin</a:t>
+            </a:r>
+            <a:r>
+              <a:rPr lang="en-US" dirty="0" smtClean="0"/>
+              <a:t> (</a:t>
+            </a:r>
+            <a:r>
+              <a:rPr lang="en-US" dirty="0" err="1" smtClean="0"/>
+              <a:t>eg</a:t>
+            </a:r>
+            <a:r>
+              <a:rPr lang="en-US" dirty="0" smtClean="0"/>
+              <a:t>: SDK2)</a:t>
+            </a:r>
+          </a:p>
+          <a:p>
+            <a:r>
+              <a:rPr lang="en-US" dirty="0" smtClean="0"/>
+              <a:t>Upload the integration </a:t>
+            </a:r>
+            <a:r>
+              <a:rPr lang="en-US" dirty="0" err="1" smtClean="0"/>
+              <a:t>plugin</a:t>
+            </a:r>
+            <a:r>
+              <a:rPr lang="en-US" dirty="0" smtClean="0"/>
+              <a:t>:</a:t>
             </a:r>
           </a:p>
           <a:p>
             <a:pPr lvl="1"/>
             <a:r>
+              <a:rPr lang="en-US" dirty="0" smtClean="0"/>
+              <a:t>Edit the </a:t>
+            </a:r>
+            <a:r>
               <a:rPr lang="en-US" dirty="0" err="1" smtClean="0"/>
-              <a:t>Hansoft</a:t>
-            </a:r>
-            <a:r>
-              <a:rPr lang="en-US" dirty="0" smtClean="0"/>
-              <a:t> Database</a:t>
+              <a:t>plugin.properties</a:t>
+            </a:r>
+            <a:r>
+              <a:rPr lang="en-US" dirty="0" smtClean="0"/>
+              <a:t> in the client folder</a:t>
+            </a:r>
+          </a:p>
+          <a:p>
+            <a:pPr lvl="2"/>
+            <a:r>
+              <a:rPr lang="en-US" dirty="0" smtClean="0"/>
+              <a:t>Set “</a:t>
+            </a:r>
+            <a:r>
+              <a:rPr lang="en-US" dirty="0" err="1" smtClean="0"/>
+              <a:t>sdkuser</a:t>
+            </a:r>
+            <a:r>
+              <a:rPr lang="en-US" dirty="0" smtClean="0"/>
+              <a:t>, </a:t>
+            </a:r>
+            <a:r>
+              <a:rPr lang="en-US" dirty="0" err="1" smtClean="0"/>
+              <a:t>sdkpassword</a:t>
+            </a:r>
+            <a:r>
+              <a:rPr lang="en-US" dirty="0" smtClean="0"/>
+              <a:t>” to the SDK2 credentials</a:t>
+            </a:r>
+          </a:p>
+          <a:p>
+            <a:pPr lvl="2"/>
+            <a:r>
+              <a:rPr lang="en-US" dirty="0" smtClean="0"/>
+              <a:t>For the “database” property, use “%20” instead of “ “ (space) if your database name contains spaces</a:t>
             </a:r>
           </a:p>
           <a:p>
             <a:pPr lvl="1"/>
             <a:r>
+              <a:rPr lang="en-US" dirty="0" smtClean="0"/>
+              <a:t>Run the </a:t>
+            </a:r>
+            <a:r>
               <a:rPr lang="en-US" dirty="0" err="1" smtClean="0"/>
-              <a:t>Hansoft</a:t>
-            </a:r>
-            <a:r>
-              <a:rPr lang="en-US" dirty="0" smtClean="0"/>
-              <a:t> SDK or library path</a:t>
-            </a:r>
+              <a:t>HansoftSVNPusher</a:t>
+            </a:r>
+            <a:r>
+              <a:rPr lang="en-US" dirty="0" smtClean="0"/>
+              <a:t> executable to upload the integration </a:t>
+            </a:r>
+            <a:r>
+              <a:rPr lang="en-US" dirty="0" err="1" smtClean="0"/>
+              <a:t>plugin</a:t>
+            </a:r>
+            <a:endParaRPr lang="en-US" dirty="0" smtClean="0"/>
           </a:p>
           <a:p>
             <a:pPr lvl="1"/>
-            <a:r>
-              <a:rPr lang="en-US" dirty="0" err="1" smtClean="0"/>
-              <a:t>Hansoft</a:t>
-            </a:r>
-            <a:r>
-              <a:rPr lang="en-US" dirty="0" smtClean="0"/>
-              <a:t> server host, </a:t>
-            </a:r>
-            <a:r>
-              <a:rPr lang="en-US" dirty="0" smtClean="0"/>
-              <a:t>port</a:t>
-            </a:r>
-          </a:p>
-          <a:p>
-            <a:pPr lvl="1"/>
-            <a:r>
-              <a:rPr lang="en-US" dirty="0" smtClean="0"/>
-              <a:t>List of managed SVN repositories</a:t>
-            </a:r>
+            <a:endParaRPr lang="en-US" dirty="0" smtClean="0"/>
           </a:p>
           <a:p>
             <a:endParaRPr lang="en-US" dirty="0" smtClean="0"/>
@@ -6742,7 +6802,7 @@
           <a:p>
             <a:r>
               <a:rPr lang="en-US" dirty="0" smtClean="0"/>
-              <a:t>Ports</a:t>
+              <a:t>Configuration</a:t>
             </a:r>
             <a:endParaRPr lang="en-US" dirty="0"/>
           </a:p>
@@ -6760,83 +6820,134 @@
         </p:nvSpPr>
         <p:spPr/>
         <p:txBody>
-          <a:bodyPr/>
-          <a:lstStyle/>
-          <a:p>
-            <a:r>
-              <a:rPr lang="en-US" dirty="0" smtClean="0"/>
-              <a:t>Integration Server listens to port 9005</a:t>
+          <a:bodyPr>
+            <a:normAutofit fontScale="92500" lnSpcReduction="10000"/>
+          </a:bodyPr>
+          <a:lstStyle/>
+          <a:p>
+            <a:r>
+              <a:rPr lang="en-US" dirty="0" smtClean="0"/>
+              <a:t>Integration Server settings</a:t>
             </a:r>
           </a:p>
           <a:p>
             <a:pPr lvl="1"/>
             <a:r>
               <a:rPr lang="en-US" dirty="0" smtClean="0"/>
-              <a:t>Configurable in the </a:t>
+              <a:t>SVN/</a:t>
             </a:r>
             <a:r>
               <a:rPr lang="en-US" dirty="0" err="1" smtClean="0"/>
-              <a:t>server.properties</a:t>
-            </a:r>
-            <a:r>
-              <a:rPr lang="en-US" dirty="0" smtClean="0"/>
-              <a:t> file</a:t>
-            </a:r>
-          </a:p>
-          <a:p>
-            <a:r>
-              <a:rPr lang="en-US" dirty="0" smtClean="0"/>
-              <a:t>The SVN annotation server listens to port 9006</a:t>
-            </a:r>
+              <a:t>Hansoft</a:t>
+            </a:r>
+            <a:r>
+              <a:rPr lang="en-US" dirty="0" smtClean="0"/>
+              <a:t> user </a:t>
+            </a:r>
+            <a:r>
+              <a:rPr lang="en-US" dirty="0" smtClean="0"/>
+              <a:t>mapping</a:t>
+            </a:r>
+          </a:p>
+          <a:p>
+            <a:pPr lvl="2"/>
+            <a:r>
+              <a:rPr lang="en-US" dirty="0" err="1" smtClean="0"/>
+              <a:t>HansoftSVNusers.map</a:t>
+            </a:r>
+            <a:r>
+              <a:rPr lang="en-US" dirty="0" smtClean="0"/>
+              <a:t> (separate file)</a:t>
+            </a:r>
+            <a:endParaRPr lang="en-US" dirty="0" smtClean="0"/>
           </a:p>
           <a:p>
             <a:pPr lvl="1"/>
             <a:r>
-              <a:rPr lang="en-US" dirty="0" smtClean="0"/>
-              <a:t>Configurable in </a:t>
+              <a:rPr lang="en-US" dirty="0" err="1" smtClean="0"/>
+              <a:t>Hansoft</a:t>
+            </a:r>
+            <a:r>
+              <a:rPr lang="en-US" dirty="0" smtClean="0"/>
+              <a:t> SDK username/</a:t>
+            </a:r>
+            <a:r>
+              <a:rPr lang="en-US" dirty="0" smtClean="0"/>
+              <a:t>password</a:t>
             </a:r>
           </a:p>
           <a:p>
             <a:pPr lvl="2"/>
             <a:r>
               <a:rPr lang="en-US" dirty="0" smtClean="0"/>
-              <a:t>hook-</a:t>
+              <a:t>Use the “SDK” user (“SDK2” is for the </a:t>
             </a:r>
             <a:r>
               <a:rPr lang="en-US" dirty="0" err="1" smtClean="0"/>
-              <a:t>config.conf</a:t>
-            </a:r>
-            <a:r>
-              <a:rPr lang="en-US" dirty="0" smtClean="0"/>
-              <a:t> file – for the SVN post-commit hook</a:t>
+              <a:t>plugin</a:t>
+            </a:r>
+            <a:r>
+              <a:rPr lang="en-US" dirty="0" smtClean="0"/>
+              <a:t> manager)</a:t>
+            </a:r>
+            <a:endParaRPr lang="en-US" dirty="0" smtClean="0"/>
+          </a:p>
+          <a:p>
+            <a:pPr lvl="1"/>
+            <a:r>
+              <a:rPr lang="en-US" dirty="0" err="1" smtClean="0"/>
+              <a:t>Hansoft</a:t>
+            </a:r>
+            <a:r>
+              <a:rPr lang="en-US" dirty="0" smtClean="0"/>
+              <a:t> </a:t>
+            </a:r>
+            <a:r>
+              <a:rPr lang="en-US" dirty="0" smtClean="0"/>
+              <a:t>Database</a:t>
             </a:r>
           </a:p>
           <a:p>
             <a:pPr lvl="2"/>
             <a:r>
+              <a:rPr lang="en-US" dirty="0" smtClean="0"/>
+              <a:t>NOTE: Here you enter name “as is” including spaces</a:t>
+            </a:r>
+          </a:p>
+          <a:p>
+            <a:pPr lvl="1"/>
+            <a:r>
               <a:rPr lang="en-US" dirty="0" err="1" smtClean="0"/>
-              <a:t>server.properties</a:t>
-            </a:r>
-            <a:r>
-              <a:rPr lang="en-US" dirty="0" smtClean="0"/>
-              <a:t> – for the Integration </a:t>
-            </a:r>
-            <a:r>
-              <a:rPr lang="en-US" dirty="0" smtClean="0"/>
-              <a:t>Server</a:t>
-            </a:r>
-          </a:p>
-          <a:p>
-            <a:pPr lvl="2"/>
+              <a:t>Hansoft</a:t>
+            </a:r>
+            <a:r>
+              <a:rPr lang="en-US" dirty="0" smtClean="0"/>
+              <a:t> SDK or library path</a:t>
+            </a:r>
+          </a:p>
+          <a:p>
+            <a:pPr lvl="1"/>
             <a:r>
               <a:rPr lang="en-US" dirty="0" err="1" smtClean="0"/>
-              <a:t>server.conf</a:t>
-            </a:r>
-            <a:r>
-              <a:rPr lang="en-US" dirty="0" smtClean="0"/>
-              <a:t> – for the SVN annotation server</a:t>
-            </a:r>
+              <a:t>Hansoft</a:t>
+            </a:r>
+            <a:r>
+              <a:rPr lang="en-US" dirty="0" smtClean="0"/>
+              <a:t> server host, port</a:t>
+            </a:r>
+          </a:p>
+          <a:p>
+            <a:pPr lvl="1"/>
+            <a:r>
+              <a:rPr lang="en-US" dirty="0" smtClean="0"/>
+              <a:t>List of managed SVN repositories</a:t>
+            </a:r>
+          </a:p>
+          <a:p>
             <a:endParaRPr lang="en-US" dirty="0" smtClean="0"/>
+          </a:p>
+          <a:p>
+            <a:endParaRPr lang="en-US" dirty="0"/>
           </a:p>
         </p:txBody>
       </p:sp>
@@ -6845,6 +6956,13 @@
   <p:clrMapOvr>
     <a:masterClrMapping/>
   </p:clrMapOvr>
+  <p:timing>
+    <p:tnLst>
+      <p:par>
+        <p:cTn id="1" dur="indefinite" restart="never" nodeType="tmRoot"/>
+      </p:par>
+    </p:tnLst>
+  </p:timing>
 </p:sld>
 </file>
 
@@ -6877,18 +6995,13 @@
         </p:nvSpPr>
         <p:spPr/>
         <p:txBody>
-          <a:bodyPr>
-            <a:normAutofit fontScale="90000"/>
-          </a:bodyPr>
-          <a:lstStyle/>
-          <a:p>
-            <a:r>
-              <a:rPr lang="en-US" dirty="0" smtClean="0"/>
-              <a:t>Launching</a:t>
-            </a:r>
-            <a:br>
-              <a:rPr lang="en-US" dirty="0" smtClean="0"/>
-            </a:br>
+          <a:bodyPr/>
+          <a:lstStyle/>
+          <a:p>
+            <a:r>
+              <a:rPr lang="en-US" dirty="0" smtClean="0"/>
+              <a:t>Ports</a:t>
+            </a:r>
             <a:endParaRPr lang="en-US" dirty="0"/>
           </a:p>
         </p:txBody>
@@ -6908,97 +7021,75 @@
           <a:bodyPr/>
           <a:lstStyle/>
           <a:p>
-            <a:pPr marL="514350" indent="-514350">
-              <a:buFont typeface="+mj-lt"/>
-              <a:buAutoNum type="arabicPeriod"/>
-            </a:pPr>
-            <a:r>
-              <a:rPr lang="en-US" dirty="0" smtClean="0"/>
-              <a:t>Start the integration server with the launch script:</a:t>
+            <a:r>
+              <a:rPr lang="en-US" dirty="0" smtClean="0"/>
+              <a:t>Integration Server listens to port 9005</a:t>
             </a:r>
           </a:p>
           <a:p>
             <a:pPr lvl="1"/>
             <a:r>
               <a:rPr lang="en-US" dirty="0" smtClean="0"/>
-              <a:t>Linux/OSX:  </a:t>
-            </a:r>
-            <a:r>
-              <a:rPr lang="en-US" dirty="0" err="1" smtClean="0">
-                <a:latin typeface="Courier New"/>
-                <a:cs typeface="Courier New"/>
-              </a:rPr>
-              <a:t>integrationserver.sh</a:t>
-            </a:r>
-            <a:endParaRPr lang="en-US" dirty="0" smtClean="0">
-              <a:latin typeface="Courier New"/>
-              <a:cs typeface="Courier New"/>
-            </a:endParaRPr>
+              <a:t>Configurable in the </a:t>
+            </a:r>
+            <a:r>
+              <a:rPr lang="en-US" dirty="0" err="1" smtClean="0"/>
+              <a:t>server.properties</a:t>
+            </a:r>
+            <a:r>
+              <a:rPr lang="en-US" dirty="0" smtClean="0"/>
+              <a:t> file</a:t>
+            </a:r>
+          </a:p>
+          <a:p>
+            <a:r>
+              <a:rPr lang="en-US" dirty="0" smtClean="0"/>
+              <a:t>The SVN annotation server listens to port 9006</a:t>
+            </a:r>
           </a:p>
           <a:p>
             <a:pPr lvl="1"/>
             <a:r>
               <a:rPr lang="en-US" dirty="0" smtClean="0"/>
-              <a:t>Windows:  </a:t>
-            </a:r>
-            <a:r>
-              <a:rPr lang="en-US" dirty="0" err="1" smtClean="0">
-                <a:latin typeface="Courier New"/>
-                <a:cs typeface="Courier New"/>
-              </a:rPr>
-              <a:t>integrationserver.bat</a:t>
-            </a:r>
-            <a:endParaRPr lang="en-US" dirty="0" smtClean="0">
-              <a:latin typeface="Courier New"/>
-              <a:cs typeface="Courier New"/>
-            </a:endParaRPr>
-          </a:p>
-          <a:p>
-            <a:pPr marL="514350" indent="-514350">
-              <a:buFont typeface="+mj-lt"/>
-              <a:buAutoNum type="arabicPeriod"/>
-            </a:pPr>
-            <a:r>
-              <a:rPr lang="en-US" dirty="0" smtClean="0"/>
-              <a:t>Start the SVN annotation server:</a:t>
-            </a:r>
-          </a:p>
-          <a:p>
-            <a:pPr lvl="1"/>
-            <a:r>
-              <a:rPr lang="en-US" dirty="0" smtClean="0"/>
-              <a:t>Linux/OSX:  </a:t>
-            </a:r>
-            <a:r>
-              <a:rPr lang="en-US" dirty="0" err="1" smtClean="0">
-                <a:latin typeface="Courier New"/>
-                <a:cs typeface="Courier New"/>
-              </a:rPr>
-              <a:t>run_hansoftserver.sh</a:t>
-            </a:r>
-            <a:endParaRPr lang="en-US" dirty="0" smtClean="0">
-              <a:latin typeface="Courier New"/>
-              <a:cs typeface="Courier New"/>
-            </a:endParaRPr>
-          </a:p>
-          <a:p>
-            <a:pPr lvl="1"/>
-            <a:r>
-              <a:rPr lang="en-US" dirty="0" smtClean="0"/>
-              <a:t>Windows:  </a:t>
-            </a:r>
-            <a:r>
-              <a:rPr lang="en-US" dirty="0" err="1" smtClean="0">
-                <a:latin typeface="Courier New"/>
-                <a:cs typeface="Courier New"/>
-              </a:rPr>
-              <a:t>run_hansoftserver.bat</a:t>
-            </a:r>
-            <a:endParaRPr lang="en-US" dirty="0" smtClean="0"/>
-          </a:p>
-          <a:p>
-            <a:pPr lvl="1"/>
-            <a:endParaRPr lang="en-US" dirty="0"/>
+              <a:t>Configurable in </a:t>
+            </a:r>
+          </a:p>
+          <a:p>
+            <a:pPr lvl="2"/>
+            <a:r>
+              <a:rPr lang="en-US" dirty="0" smtClean="0"/>
+              <a:t>hook-</a:t>
+            </a:r>
+            <a:r>
+              <a:rPr lang="en-US" dirty="0" err="1" smtClean="0"/>
+              <a:t>config.conf</a:t>
+            </a:r>
+            <a:r>
+              <a:rPr lang="en-US" dirty="0" smtClean="0"/>
+              <a:t> file – for the SVN post-commit hook</a:t>
+            </a:r>
+          </a:p>
+          <a:p>
+            <a:pPr lvl="2"/>
+            <a:r>
+              <a:rPr lang="en-US" dirty="0" err="1" smtClean="0"/>
+              <a:t>server.properties</a:t>
+            </a:r>
+            <a:r>
+              <a:rPr lang="en-US" dirty="0" smtClean="0"/>
+              <a:t> – for the Integration Server</a:t>
+            </a:r>
+          </a:p>
+          <a:p>
+            <a:pPr lvl="2"/>
+            <a:r>
+              <a:rPr lang="en-US" dirty="0" err="1" smtClean="0"/>
+              <a:t>server.conf</a:t>
+            </a:r>
+            <a:r>
+              <a:rPr lang="en-US" dirty="0" smtClean="0"/>
+              <a:t> – for the SVN annotation server</a:t>
+            </a:r>
           </a:p>
         </p:txBody>
       </p:sp>
@@ -7039,62 +7130,149 @@
         </p:nvSpPr>
         <p:spPr/>
         <p:txBody>
+          <a:bodyPr>
+            <a:normAutofit fontScale="90000"/>
+          </a:bodyPr>
+          <a:lstStyle/>
+          <a:p>
+            <a:r>
+              <a:rPr lang="en-US" dirty="0" smtClean="0"/>
+              <a:t>Launching</a:t>
+            </a:r>
+            <a:br>
+              <a:rPr lang="en-US" dirty="0" smtClean="0"/>
+            </a:br>
+            <a:endParaRPr lang="en-US" dirty="0"/>
+          </a:p>
+        </p:txBody>
+      </p:sp>
+      <p:sp>
+        <p:nvSpPr>
+          <p:cNvPr id="3" name="Platshållare för innehåll 2"/>
+          <p:cNvSpPr>
+            <a:spLocks noGrp="1"/>
+          </p:cNvSpPr>
+          <p:nvPr>
+            <p:ph idx="1"/>
+          </p:nvPr>
+        </p:nvSpPr>
+        <p:spPr/>
+        <p:txBody>
           <a:bodyPr/>
           <a:lstStyle/>
           <a:p>
-            <a:r>
-              <a:rPr lang="en-US" dirty="0" smtClean="0"/>
-              <a:t>Limitations</a:t>
-            </a:r>
+            <a:pPr marL="514350" indent="-514350">
+              <a:buFont typeface="+mj-lt"/>
+              <a:buAutoNum type="arabicPeriod"/>
+            </a:pPr>
+            <a:r>
+              <a:rPr lang="en-US" dirty="0" smtClean="0"/>
+              <a:t>Start the integration server with the launch script:</a:t>
+            </a:r>
+          </a:p>
+          <a:p>
+            <a:pPr lvl="1"/>
+            <a:r>
+              <a:rPr lang="en-US" dirty="0" smtClean="0"/>
+              <a:t>Linux/OSX:  </a:t>
+            </a:r>
+            <a:r>
+              <a:rPr lang="en-US" sz="2400" dirty="0" err="1" smtClean="0">
+                <a:latin typeface="Courier New"/>
+                <a:cs typeface="Courier New"/>
+              </a:rPr>
+              <a:t>integrationserver.sh</a:t>
+            </a:r>
+            <a:endParaRPr lang="en-US" sz="2400" dirty="0" smtClean="0">
+              <a:latin typeface="Courier New"/>
+              <a:cs typeface="Courier New"/>
+            </a:endParaRPr>
+          </a:p>
+          <a:p>
+            <a:pPr lvl="1"/>
+            <a:r>
+              <a:rPr lang="en-US" dirty="0" smtClean="0"/>
+              <a:t>Windows:  </a:t>
+            </a:r>
+            <a:r>
+              <a:rPr lang="en-US" sz="2400" dirty="0" err="1" smtClean="0">
+                <a:latin typeface="Courier New"/>
+                <a:cs typeface="Courier New"/>
+              </a:rPr>
+              <a:t>integrationserver.bat</a:t>
+            </a:r>
+            <a:endParaRPr lang="en-US" sz="2400" dirty="0" smtClean="0">
+              <a:latin typeface="Courier New"/>
+              <a:cs typeface="Courier New"/>
+            </a:endParaRPr>
+          </a:p>
+          <a:p>
+            <a:pPr marL="514350" indent="-514350">
+              <a:buFont typeface="+mj-lt"/>
+              <a:buAutoNum type="arabicPeriod"/>
+            </a:pPr>
+            <a:r>
+              <a:rPr lang="en-US" dirty="0" smtClean="0"/>
+              <a:t>Start the SVN annotation server:</a:t>
+            </a:r>
+          </a:p>
+          <a:p>
+            <a:pPr lvl="1"/>
+            <a:r>
+              <a:rPr lang="en-US" dirty="0" smtClean="0"/>
+              <a:t>Linux/OSX: </a:t>
+            </a:r>
+            <a:r>
+              <a:rPr lang="en-US" dirty="0" smtClean="0"/>
+              <a:t> </a:t>
+            </a:r>
+            <a:r>
+              <a:rPr lang="en-US" sz="2400" dirty="0" err="1" smtClean="0">
+                <a:latin typeface="Courier New"/>
+                <a:cs typeface="Courier New"/>
+              </a:rPr>
+              <a:t>sudo</a:t>
+            </a:r>
+            <a:r>
+              <a:rPr lang="en-US" sz="2400" dirty="0" smtClean="0">
+                <a:latin typeface="Courier New"/>
+                <a:cs typeface="Courier New"/>
+              </a:rPr>
+              <a:t> ./</a:t>
+            </a:r>
+            <a:r>
+              <a:rPr lang="en-US" sz="2400" dirty="0" err="1" smtClean="0">
+                <a:latin typeface="Courier New"/>
+                <a:cs typeface="Courier New"/>
+              </a:rPr>
+              <a:t>run_hansoftserver.sh</a:t>
+            </a:r>
+            <a:endParaRPr lang="en-US" sz="2400" dirty="0" smtClean="0">
+              <a:latin typeface="Courier New"/>
+              <a:cs typeface="Courier New"/>
+            </a:endParaRPr>
+          </a:p>
+          <a:p>
+            <a:pPr lvl="1"/>
+            <a:r>
+              <a:rPr lang="en-US" dirty="0" smtClean="0"/>
+              <a:t>Windows:  </a:t>
+            </a:r>
+            <a:r>
+              <a:rPr lang="en-US" sz="2400" dirty="0" err="1" smtClean="0">
+                <a:latin typeface="Courier New"/>
+                <a:cs typeface="Courier New"/>
+              </a:rPr>
+              <a:t>run_hansoftserver.bat</a:t>
+            </a:r>
+            <a:endParaRPr lang="en-US" sz="2400" dirty="0" smtClean="0">
+              <a:latin typeface="Courier New"/>
+              <a:cs typeface="Courier New"/>
+            </a:endParaRPr>
+          </a:p>
+          <a:p>
+            <a:pPr lvl="1"/>
             <a:endParaRPr lang="en-US" dirty="0"/>
-          </a:p>
-        </p:txBody>
-      </p:sp>
-      <p:sp>
-        <p:nvSpPr>
-          <p:cNvPr id="3" name="Platshållare för innehåll 2"/>
-          <p:cNvSpPr>
-            <a:spLocks noGrp="1"/>
-          </p:cNvSpPr>
-          <p:nvPr>
-            <p:ph idx="1"/>
-          </p:nvPr>
-        </p:nvSpPr>
-        <p:spPr/>
-        <p:txBody>
-          <a:bodyPr/>
-          <a:lstStyle/>
-          <a:p>
-            <a:pPr>
-              <a:buNone/>
-            </a:pPr>
-            <a:r>
-              <a:rPr lang="en-US" dirty="0" smtClean="0"/>
-              <a:t>Limitations as of 2014</a:t>
-            </a:r>
-            <a:r>
-              <a:rPr lang="en-US" dirty="0" smtClean="0"/>
-              <a:t>-10-27:</a:t>
-            </a:r>
-            <a:endParaRPr lang="en-US" dirty="0" smtClean="0"/>
-          </a:p>
-          <a:p>
-            <a:r>
-              <a:rPr lang="en-US" dirty="0" smtClean="0"/>
-              <a:t>Connecting </a:t>
-            </a:r>
-            <a:r>
-              <a:rPr lang="en-US" dirty="0" err="1" smtClean="0"/>
-              <a:t>Hansoft</a:t>
-            </a:r>
-            <a:r>
-              <a:rPr lang="en-US" dirty="0" smtClean="0"/>
-              <a:t> items to previous commits not yet </a:t>
-            </a:r>
-            <a:r>
-              <a:rPr lang="en-US" dirty="0" smtClean="0"/>
-              <a:t>implemented – implemented shortly ;-)</a:t>
-            </a:r>
           </a:p>
         </p:txBody>
       </p:sp>

</xml_diff>